<commit_message>
Update documentation and compile
</commit_message>
<xml_diff>
--- a/app/documentation/architectures.pptx
+++ b/app/documentation/architectures.pptx
@@ -10,6 +10,7 @@
     <p:sldId id="258" r:id="rId4"/>
     <p:sldId id="259" r:id="rId5"/>
     <p:sldId id="260" r:id="rId6"/>
+    <p:sldId id="261" r:id="rId7"/>
   </p:sldIdLst>
   <p:sldSz cx="12192000" cy="6858000"/>
   <p:notesSz cx="6858000" cy="9144000"/>
@@ -9941,6 +9942,2582 @@
 </p:sld>
 </file>
 
+<file path=ppt/slides/slide6.xml><?xml version="1.0" encoding="utf-8"?>
+<p:sld xmlns:a="http://schemas.openxmlformats.org/drawingml/2006/main" xmlns:r="http://schemas.openxmlformats.org/officeDocument/2006/relationships" xmlns:p="http://schemas.openxmlformats.org/presentationml/2006/main">
+  <p:cSld>
+    <p:spTree>
+      <p:nvGrpSpPr>
+        <p:cNvPr id="1" name=""/>
+        <p:cNvGrpSpPr/>
+        <p:nvPr/>
+      </p:nvGrpSpPr>
+      <p:grpSpPr>
+        <a:xfrm>
+          <a:off x="0" y="0"/>
+          <a:ext cx="0" cy="0"/>
+          <a:chOff x="0" y="0"/>
+          <a:chExt cx="0" cy="0"/>
+        </a:xfrm>
+      </p:grpSpPr>
+      <p:pic>
+        <p:nvPicPr>
+          <p:cNvPr id="1024" name="Picture 4" descr="Free Folder SVG, PNG Icon, Symbol. Download Image.">
+            <a:extLst>
+              <a:ext uri="{FF2B5EF4-FFF2-40B4-BE49-F238E27FC236}">
+                <a16:creationId xmlns:a16="http://schemas.microsoft.com/office/drawing/2014/main" id="{F41B6C24-9276-ED3A-8036-A127DE42BF48}"/>
+              </a:ext>
+            </a:extLst>
+          </p:cNvPr>
+          <p:cNvPicPr>
+            <a:picLocks noChangeAspect="1" noChangeArrowheads="1"/>
+          </p:cNvPicPr>
+          <p:nvPr/>
+        </p:nvPicPr>
+        <p:blipFill>
+          <a:blip r:embed="rId2">
+            <a:extLst>
+              <a:ext uri="{28A0092B-C50C-407E-A947-70E740481C1C}">
+                <a14:useLocalDpi xmlns:a14="http://schemas.microsoft.com/office/drawing/2010/main" val="0"/>
+              </a:ext>
+            </a:extLst>
+          </a:blip>
+          <a:srcRect/>
+          <a:stretch>
+            <a:fillRect/>
+          </a:stretch>
+        </p:blipFill>
+        <p:spPr bwMode="auto">
+          <a:xfrm>
+            <a:off x="3413689" y="6102257"/>
+            <a:ext cx="478895" cy="478895"/>
+          </a:xfrm>
+          <a:prstGeom prst="rect">
+            <a:avLst/>
+          </a:prstGeom>
+          <a:noFill/>
+          <a:extLst>
+            <a:ext uri="{909E8E84-426E-40DD-AFC4-6F175D3DCCD1}">
+              <a14:hiddenFill xmlns:a14="http://schemas.microsoft.com/office/drawing/2010/main">
+                <a:solidFill>
+                  <a:srgbClr val="FFFFFF"/>
+                </a:solidFill>
+              </a14:hiddenFill>
+            </a:ext>
+          </a:extLst>
+        </p:spPr>
+      </p:pic>
+      <p:pic>
+        <p:nvPicPr>
+          <p:cNvPr id="15" name="Picture 4" descr="Free Folder SVG, PNG Icon, Symbol. Download Image.">
+            <a:extLst>
+              <a:ext uri="{FF2B5EF4-FFF2-40B4-BE49-F238E27FC236}">
+                <a16:creationId xmlns:a16="http://schemas.microsoft.com/office/drawing/2014/main" id="{AA6D885D-F950-D279-B0F2-57AEF3A6C88F}"/>
+              </a:ext>
+            </a:extLst>
+          </p:cNvPr>
+          <p:cNvPicPr>
+            <a:picLocks noChangeAspect="1" noChangeArrowheads="1"/>
+          </p:cNvPicPr>
+          <p:nvPr/>
+        </p:nvPicPr>
+        <p:blipFill>
+          <a:blip r:embed="rId2">
+            <a:extLst>
+              <a:ext uri="{28A0092B-C50C-407E-A947-70E740481C1C}">
+                <a14:useLocalDpi xmlns:a14="http://schemas.microsoft.com/office/drawing/2010/main" val="0"/>
+              </a:ext>
+            </a:extLst>
+          </a:blip>
+          <a:srcRect/>
+          <a:stretch>
+            <a:fillRect/>
+          </a:stretch>
+        </p:blipFill>
+        <p:spPr bwMode="auto">
+          <a:xfrm>
+            <a:off x="3433423" y="636936"/>
+            <a:ext cx="478895" cy="478895"/>
+          </a:xfrm>
+          <a:prstGeom prst="rect">
+            <a:avLst/>
+          </a:prstGeom>
+          <a:noFill/>
+          <a:extLst>
+            <a:ext uri="{909E8E84-426E-40DD-AFC4-6F175D3DCCD1}">
+              <a14:hiddenFill xmlns:a14="http://schemas.microsoft.com/office/drawing/2010/main">
+                <a:solidFill>
+                  <a:srgbClr val="FFFFFF"/>
+                </a:solidFill>
+              </a14:hiddenFill>
+            </a:ext>
+          </a:extLst>
+        </p:spPr>
+      </p:pic>
+      <p:sp>
+        <p:nvSpPr>
+          <p:cNvPr id="7" name="Rectangle 6">
+            <a:extLst>
+              <a:ext uri="{FF2B5EF4-FFF2-40B4-BE49-F238E27FC236}">
+                <a16:creationId xmlns:a16="http://schemas.microsoft.com/office/drawing/2014/main" id="{EB6197BC-8271-F4B1-09CE-BAC44DFD6104}"/>
+              </a:ext>
+            </a:extLst>
+          </p:cNvPr>
+          <p:cNvSpPr/>
+          <p:nvPr/>
+        </p:nvSpPr>
+        <p:spPr>
+          <a:xfrm>
+            <a:off x="6082620" y="1694689"/>
+            <a:ext cx="2867177" cy="476250"/>
+          </a:xfrm>
+          <a:prstGeom prst="rect">
+            <a:avLst/>
+          </a:prstGeom>
+          <a:noFill/>
+          <a:ln>
+            <a:noFill/>
+          </a:ln>
+        </p:spPr>
+        <p:style>
+          <a:lnRef idx="0">
+            <a:scrgbClr r="0" g="0" b="0"/>
+          </a:lnRef>
+          <a:fillRef idx="0">
+            <a:scrgbClr r="0" g="0" b="0"/>
+          </a:fillRef>
+          <a:effectRef idx="0">
+            <a:scrgbClr r="0" g="0" b="0"/>
+          </a:effectRef>
+          <a:fontRef idx="minor">
+            <a:schemeClr val="dk1"/>
+          </a:fontRef>
+        </p:style>
+        <p:txBody>
+          <a:bodyPr rtlCol="0" anchor="ctr"/>
+          <a:lstStyle/>
+          <a:p>
+            <a:pPr marL="285750" indent="-285750">
+              <a:buFont typeface="Arial" panose="020B0604020202020204" pitchFamily="34" charset="0"/>
+              <a:buChar char="•"/>
+            </a:pPr>
+            <a:r>
+              <a:rPr lang="en-US" sz="1400" b="1" dirty="0">
+                <a:latin typeface="Calibri" panose="020F0502020204030204" pitchFamily="34" charset="0"/>
+                <a:ea typeface="Calibri" panose="020F0502020204030204" pitchFamily="34" charset="0"/>
+                <a:cs typeface="Calibri" panose="020F0502020204030204" pitchFamily="34" charset="0"/>
+              </a:rPr>
+              <a:t>Selected model</a:t>
+            </a:r>
+          </a:p>
+          <a:p>
+            <a:pPr marL="285750" indent="-285750">
+              <a:buFont typeface="Arial" panose="020B0604020202020204" pitchFamily="34" charset="0"/>
+              <a:buChar char="•"/>
+            </a:pPr>
+            <a:r>
+              <a:rPr lang="en-US" sz="1400" b="1" dirty="0" err="1">
+                <a:latin typeface="Calibri" panose="020F0502020204030204" pitchFamily="34" charset="0"/>
+                <a:ea typeface="Calibri" panose="020F0502020204030204" pitchFamily="34" charset="0"/>
+                <a:cs typeface="Calibri" panose="020F0502020204030204" pitchFamily="34" charset="0"/>
+              </a:rPr>
+              <a:t>taxi_data</a:t>
+            </a:r>
+            <a:r>
+              <a:rPr lang="en-US" sz="1400" b="1" dirty="0">
+                <a:latin typeface="Calibri" panose="020F0502020204030204" pitchFamily="34" charset="0"/>
+                <a:ea typeface="Calibri" panose="020F0502020204030204" pitchFamily="34" charset="0"/>
+                <a:cs typeface="Calibri" panose="020F0502020204030204" pitchFamily="34" charset="0"/>
+              </a:rPr>
+              <a:t>, </a:t>
+            </a:r>
+            <a:r>
+              <a:rPr lang="en-US" sz="1400" b="1" dirty="0" err="1">
+                <a:latin typeface="Calibri" panose="020F0502020204030204" pitchFamily="34" charset="0"/>
+                <a:ea typeface="Calibri" panose="020F0502020204030204" pitchFamily="34" charset="0"/>
+                <a:cs typeface="Calibri" panose="020F0502020204030204" pitchFamily="34" charset="0"/>
+              </a:rPr>
+              <a:t>nyc_temperature</a:t>
+            </a:r>
+            <a:endParaRPr lang="en-US" sz="1400" b="1" dirty="0">
+              <a:latin typeface="Calibri" panose="020F0502020204030204" pitchFamily="34" charset="0"/>
+              <a:ea typeface="Calibri" panose="020F0502020204030204" pitchFamily="34" charset="0"/>
+              <a:cs typeface="Calibri" panose="020F0502020204030204" pitchFamily="34" charset="0"/>
+            </a:endParaRPr>
+          </a:p>
+          <a:p>
+            <a:pPr marL="285750" indent="-285750">
+              <a:buFont typeface="Arial" panose="020B0604020202020204" pitchFamily="34" charset="0"/>
+              <a:buChar char="•"/>
+            </a:pPr>
+            <a:r>
+              <a:rPr lang="en-US" sz="1400" b="1" dirty="0" err="1">
+                <a:latin typeface="Calibri" panose="020F0502020204030204" pitchFamily="34" charset="0"/>
+                <a:ea typeface="Calibri" panose="020F0502020204030204" pitchFamily="34" charset="0"/>
+                <a:cs typeface="Calibri" panose="020F0502020204030204" pitchFamily="34" charset="0"/>
+              </a:rPr>
+              <a:t>nyc</a:t>
+            </a:r>
+            <a:r>
+              <a:rPr lang="en-US" sz="1400" b="1" dirty="0">
+                <a:latin typeface="Calibri" panose="020F0502020204030204" pitchFamily="34" charset="0"/>
+                <a:ea typeface="Calibri" panose="020F0502020204030204" pitchFamily="34" charset="0"/>
+                <a:cs typeface="Calibri" panose="020F0502020204030204" pitchFamily="34" charset="0"/>
+              </a:rPr>
+              <a:t> map coordinates</a:t>
+            </a:r>
+          </a:p>
+          <a:p>
+            <a:pPr marL="285750" indent="-285750">
+              <a:buFont typeface="Arial" panose="020B0604020202020204" pitchFamily="34" charset="0"/>
+              <a:buChar char="•"/>
+            </a:pPr>
+            <a:endParaRPr lang="pl-PL" sz="1400" b="1" dirty="0">
+              <a:latin typeface="Calibri" panose="020F0502020204030204" pitchFamily="34" charset="0"/>
+              <a:ea typeface="Calibri" panose="020F0502020204030204" pitchFamily="34" charset="0"/>
+              <a:cs typeface="Calibri" panose="020F0502020204030204" pitchFamily="34" charset="0"/>
+            </a:endParaRPr>
+          </a:p>
+        </p:txBody>
+      </p:sp>
+      <p:sp>
+        <p:nvSpPr>
+          <p:cNvPr id="28" name="Rectangle 27">
+            <a:extLst>
+              <a:ext uri="{FF2B5EF4-FFF2-40B4-BE49-F238E27FC236}">
+                <a16:creationId xmlns:a16="http://schemas.microsoft.com/office/drawing/2014/main" id="{203A929A-9675-141C-33B8-41E22C146F6D}"/>
+              </a:ext>
+            </a:extLst>
+          </p:cNvPr>
+          <p:cNvSpPr/>
+          <p:nvPr/>
+        </p:nvSpPr>
+        <p:spPr>
+          <a:xfrm>
+            <a:off x="3433423" y="667079"/>
+            <a:ext cx="561884" cy="479626"/>
+          </a:xfrm>
+          <a:prstGeom prst="rect">
+            <a:avLst/>
+          </a:prstGeom>
+          <a:noFill/>
+          <a:ln>
+            <a:noFill/>
+          </a:ln>
+        </p:spPr>
+        <p:style>
+          <a:lnRef idx="0">
+            <a:scrgbClr r="0" g="0" b="0"/>
+          </a:lnRef>
+          <a:fillRef idx="0">
+            <a:scrgbClr r="0" g="0" b="0"/>
+          </a:fillRef>
+          <a:effectRef idx="0">
+            <a:scrgbClr r="0" g="0" b="0"/>
+          </a:effectRef>
+          <a:fontRef idx="minor">
+            <a:schemeClr val="dk1"/>
+          </a:fontRef>
+        </p:style>
+        <p:txBody>
+          <a:bodyPr rtlCol="0" anchor="ctr"/>
+          <a:lstStyle/>
+          <a:p>
+            <a:r>
+              <a:rPr lang="en-US" sz="1400" b="1" dirty="0">
+                <a:latin typeface="Calibri" panose="020F0502020204030204" pitchFamily="34" charset="0"/>
+                <a:ea typeface="Calibri" panose="020F0502020204030204" pitchFamily="34" charset="0"/>
+                <a:cs typeface="Calibri" panose="020F0502020204030204" pitchFamily="34" charset="0"/>
+              </a:rPr>
+              <a:t>app</a:t>
+            </a:r>
+            <a:endParaRPr lang="pl-PL" sz="1400" b="1" dirty="0">
+              <a:latin typeface="Calibri" panose="020F0502020204030204" pitchFamily="34" charset="0"/>
+              <a:ea typeface="Calibri" panose="020F0502020204030204" pitchFamily="34" charset="0"/>
+              <a:cs typeface="Calibri" panose="020F0502020204030204" pitchFamily="34" charset="0"/>
+            </a:endParaRPr>
+          </a:p>
+        </p:txBody>
+      </p:sp>
+      <p:cxnSp>
+        <p:nvCxnSpPr>
+          <p:cNvPr id="41" name="Straight Arrow Connector 40">
+            <a:extLst>
+              <a:ext uri="{FF2B5EF4-FFF2-40B4-BE49-F238E27FC236}">
+                <a16:creationId xmlns:a16="http://schemas.microsoft.com/office/drawing/2014/main" id="{993D2131-0AAD-FA64-6C69-DBCFFB945612}"/>
+              </a:ext>
+            </a:extLst>
+          </p:cNvPr>
+          <p:cNvCxnSpPr>
+            <a:cxnSpLocks/>
+          </p:cNvCxnSpPr>
+          <p:nvPr/>
+        </p:nvCxnSpPr>
+        <p:spPr>
+          <a:xfrm flipV="1">
+            <a:off x="5317767" y="1853526"/>
+            <a:ext cx="737082" cy="12738"/>
+          </a:xfrm>
+          <a:prstGeom prst="straightConnector1">
+            <a:avLst/>
+          </a:prstGeom>
+          <a:ln w="9525">
+            <a:prstDash val="dash"/>
+            <a:tailEnd type="triangle"/>
+          </a:ln>
+        </p:spPr>
+        <p:style>
+          <a:lnRef idx="2">
+            <a:schemeClr val="dk1"/>
+          </a:lnRef>
+          <a:fillRef idx="0">
+            <a:schemeClr val="dk1"/>
+          </a:fillRef>
+          <a:effectRef idx="1">
+            <a:schemeClr val="dk1"/>
+          </a:effectRef>
+          <a:fontRef idx="minor">
+            <a:schemeClr val="tx1"/>
+          </a:fontRef>
+        </p:style>
+      </p:cxnSp>
+      <p:sp>
+        <p:nvSpPr>
+          <p:cNvPr id="42" name="Rectangle 41">
+            <a:extLst>
+              <a:ext uri="{FF2B5EF4-FFF2-40B4-BE49-F238E27FC236}">
+                <a16:creationId xmlns:a16="http://schemas.microsoft.com/office/drawing/2014/main" id="{67DB5D98-9222-900E-8015-86529939B5A9}"/>
+              </a:ext>
+            </a:extLst>
+          </p:cNvPr>
+          <p:cNvSpPr/>
+          <p:nvPr/>
+        </p:nvSpPr>
+        <p:spPr>
+          <a:xfrm>
+            <a:off x="6082620" y="2461901"/>
+            <a:ext cx="3346211" cy="298868"/>
+          </a:xfrm>
+          <a:prstGeom prst="rect">
+            <a:avLst/>
+          </a:prstGeom>
+          <a:noFill/>
+          <a:ln>
+            <a:noFill/>
+          </a:ln>
+        </p:spPr>
+        <p:style>
+          <a:lnRef idx="0">
+            <a:scrgbClr r="0" g="0" b="0"/>
+          </a:lnRef>
+          <a:fillRef idx="0">
+            <a:scrgbClr r="0" g="0" b="0"/>
+          </a:fillRef>
+          <a:effectRef idx="0">
+            <a:scrgbClr r="0" g="0" b="0"/>
+          </a:effectRef>
+          <a:fontRef idx="minor">
+            <a:schemeClr val="dk1"/>
+          </a:fontRef>
+        </p:style>
+        <p:txBody>
+          <a:bodyPr rtlCol="0" anchor="ctr"/>
+          <a:lstStyle/>
+          <a:p>
+            <a:r>
+              <a:rPr lang="en-US" sz="1400" b="1" dirty="0">
+                <a:latin typeface="Calibri" panose="020F0502020204030204" pitchFamily="34" charset="0"/>
+                <a:ea typeface="Calibri" panose="020F0502020204030204" pitchFamily="34" charset="0"/>
+                <a:cs typeface="Calibri" panose="020F0502020204030204" pitchFamily="34" charset="0"/>
+              </a:rPr>
+              <a:t>All python functions and files</a:t>
+            </a:r>
+            <a:endParaRPr lang="pl-PL" sz="1400" b="1" dirty="0">
+              <a:latin typeface="Calibri" panose="020F0502020204030204" pitchFamily="34" charset="0"/>
+              <a:ea typeface="Calibri" panose="020F0502020204030204" pitchFamily="34" charset="0"/>
+              <a:cs typeface="Calibri" panose="020F0502020204030204" pitchFamily="34" charset="0"/>
+            </a:endParaRPr>
+          </a:p>
+        </p:txBody>
+      </p:sp>
+      <p:pic>
+        <p:nvPicPr>
+          <p:cNvPr id="1028" name="Picture 4" descr="Free Folder SVG, PNG Icon, Symbol. Download Image.">
+            <a:extLst>
+              <a:ext uri="{FF2B5EF4-FFF2-40B4-BE49-F238E27FC236}">
+                <a16:creationId xmlns:a16="http://schemas.microsoft.com/office/drawing/2014/main" id="{7BD98347-7456-3645-EA8C-EE0A1B71E750}"/>
+              </a:ext>
+            </a:extLst>
+          </p:cNvPr>
+          <p:cNvPicPr>
+            <a:picLocks noChangeAspect="1" noChangeArrowheads="1"/>
+          </p:cNvPicPr>
+          <p:nvPr/>
+        </p:nvPicPr>
+        <p:blipFill>
+          <a:blip r:embed="rId2">
+            <a:extLst>
+              <a:ext uri="{28A0092B-C50C-407E-A947-70E740481C1C}">
+                <a14:useLocalDpi xmlns:a14="http://schemas.microsoft.com/office/drawing/2010/main" val="0"/>
+              </a:ext>
+            </a:extLst>
+          </a:blip>
+          <a:srcRect/>
+          <a:stretch>
+            <a:fillRect/>
+          </a:stretch>
+        </p:blipFill>
+        <p:spPr bwMode="auto">
+          <a:xfrm>
+            <a:off x="2033887" y="188184"/>
+            <a:ext cx="478895" cy="478895"/>
+          </a:xfrm>
+          <a:prstGeom prst="rect">
+            <a:avLst/>
+          </a:prstGeom>
+          <a:noFill/>
+          <a:extLst>
+            <a:ext uri="{909E8E84-426E-40DD-AFC4-6F175D3DCCD1}">
+              <a14:hiddenFill xmlns:a14="http://schemas.microsoft.com/office/drawing/2010/main">
+                <a:solidFill>
+                  <a:srgbClr val="FFFFFF"/>
+                </a:solidFill>
+              </a14:hiddenFill>
+            </a:ext>
+          </a:extLst>
+        </p:spPr>
+      </p:pic>
+      <p:cxnSp>
+        <p:nvCxnSpPr>
+          <p:cNvPr id="11" name="Straight Connector 10">
+            <a:extLst>
+              <a:ext uri="{FF2B5EF4-FFF2-40B4-BE49-F238E27FC236}">
+                <a16:creationId xmlns:a16="http://schemas.microsoft.com/office/drawing/2014/main" id="{12CE5640-2E23-3E4E-D490-E2890B134AFC}"/>
+              </a:ext>
+            </a:extLst>
+          </p:cNvPr>
+          <p:cNvCxnSpPr>
+            <a:cxnSpLocks/>
+          </p:cNvCxnSpPr>
+          <p:nvPr/>
+        </p:nvCxnSpPr>
+        <p:spPr>
+          <a:xfrm>
+            <a:off x="2273335" y="747987"/>
+            <a:ext cx="0" cy="5629660"/>
+          </a:xfrm>
+          <a:prstGeom prst="line">
+            <a:avLst/>
+          </a:prstGeom>
+        </p:spPr>
+        <p:style>
+          <a:lnRef idx="2">
+            <a:schemeClr val="dk1"/>
+          </a:lnRef>
+          <a:fillRef idx="0">
+            <a:schemeClr val="dk1"/>
+          </a:fillRef>
+          <a:effectRef idx="1">
+            <a:schemeClr val="dk1"/>
+          </a:effectRef>
+          <a:fontRef idx="minor">
+            <a:schemeClr val="tx1"/>
+          </a:fontRef>
+        </p:style>
+      </p:cxnSp>
+      <p:cxnSp>
+        <p:nvCxnSpPr>
+          <p:cNvPr id="13" name="Straight Connector 12">
+            <a:extLst>
+              <a:ext uri="{FF2B5EF4-FFF2-40B4-BE49-F238E27FC236}">
+                <a16:creationId xmlns:a16="http://schemas.microsoft.com/office/drawing/2014/main" id="{0BDE9A1D-51A9-1F2D-33F9-9817195D1AA9}"/>
+              </a:ext>
+            </a:extLst>
+          </p:cNvPr>
+          <p:cNvCxnSpPr>
+            <a:cxnSpLocks/>
+          </p:cNvCxnSpPr>
+          <p:nvPr/>
+        </p:nvCxnSpPr>
+        <p:spPr>
+          <a:xfrm>
+            <a:off x="2284909" y="917594"/>
+            <a:ext cx="1060174" cy="0"/>
+          </a:xfrm>
+          <a:prstGeom prst="line">
+            <a:avLst/>
+          </a:prstGeom>
+        </p:spPr>
+        <p:style>
+          <a:lnRef idx="2">
+            <a:schemeClr val="dk1"/>
+          </a:lnRef>
+          <a:fillRef idx="0">
+            <a:schemeClr val="dk1"/>
+          </a:fillRef>
+          <a:effectRef idx="1">
+            <a:schemeClr val="dk1"/>
+          </a:effectRef>
+          <a:fontRef idx="minor">
+            <a:schemeClr val="tx1"/>
+          </a:fontRef>
+        </p:style>
+      </p:cxnSp>
+      <p:cxnSp>
+        <p:nvCxnSpPr>
+          <p:cNvPr id="16" name="Straight Connector 15">
+            <a:extLst>
+              <a:ext uri="{FF2B5EF4-FFF2-40B4-BE49-F238E27FC236}">
+                <a16:creationId xmlns:a16="http://schemas.microsoft.com/office/drawing/2014/main" id="{C31C0BC6-4544-6246-282D-72A67EF6C852}"/>
+              </a:ext>
+            </a:extLst>
+          </p:cNvPr>
+          <p:cNvCxnSpPr>
+            <a:cxnSpLocks/>
+          </p:cNvCxnSpPr>
+          <p:nvPr/>
+        </p:nvCxnSpPr>
+        <p:spPr>
+          <a:xfrm>
+            <a:off x="3659354" y="1145833"/>
+            <a:ext cx="0" cy="3368290"/>
+          </a:xfrm>
+          <a:prstGeom prst="line">
+            <a:avLst/>
+          </a:prstGeom>
+        </p:spPr>
+        <p:style>
+          <a:lnRef idx="2">
+            <a:schemeClr val="dk1"/>
+          </a:lnRef>
+          <a:fillRef idx="0">
+            <a:schemeClr val="dk1"/>
+          </a:fillRef>
+          <a:effectRef idx="1">
+            <a:schemeClr val="dk1"/>
+          </a:effectRef>
+          <a:fontRef idx="minor">
+            <a:schemeClr val="tx1"/>
+          </a:fontRef>
+        </p:style>
+      </p:cxnSp>
+      <p:sp>
+        <p:nvSpPr>
+          <p:cNvPr id="26" name="Rectangle 25">
+            <a:extLst>
+              <a:ext uri="{FF2B5EF4-FFF2-40B4-BE49-F238E27FC236}">
+                <a16:creationId xmlns:a16="http://schemas.microsoft.com/office/drawing/2014/main" id="{491CD2AA-9F41-D25C-7E14-D7F304FE1DA6}"/>
+              </a:ext>
+            </a:extLst>
+          </p:cNvPr>
+          <p:cNvSpPr/>
+          <p:nvPr/>
+        </p:nvSpPr>
+        <p:spPr>
+          <a:xfrm>
+            <a:off x="886379" y="303290"/>
+            <a:ext cx="2963119" cy="252884"/>
+          </a:xfrm>
+          <a:prstGeom prst="rect">
+            <a:avLst/>
+          </a:prstGeom>
+          <a:noFill/>
+          <a:ln>
+            <a:noFill/>
+          </a:ln>
+        </p:spPr>
+        <p:style>
+          <a:lnRef idx="0">
+            <a:scrgbClr r="0" g="0" b="0"/>
+          </a:lnRef>
+          <a:fillRef idx="0">
+            <a:scrgbClr r="0" g="0" b="0"/>
+          </a:fillRef>
+          <a:effectRef idx="0">
+            <a:scrgbClr r="0" g="0" b="0"/>
+          </a:effectRef>
+          <a:fontRef idx="minor">
+            <a:schemeClr val="dk1"/>
+          </a:fontRef>
+        </p:style>
+        <p:txBody>
+          <a:bodyPr rtlCol="0" anchor="ctr"/>
+          <a:lstStyle/>
+          <a:p>
+            <a:pPr algn="ctr"/>
+            <a:r>
+              <a:rPr lang="en-US" sz="1200" b="1" dirty="0">
+                <a:latin typeface="Calibri" panose="020F0502020204030204" pitchFamily="34" charset="0"/>
+                <a:ea typeface="Calibri" panose="020F0502020204030204" pitchFamily="34" charset="0"/>
+                <a:cs typeface="Calibri" panose="020F0502020204030204" pitchFamily="34" charset="0"/>
+              </a:rPr>
+              <a:t>REPRODUCIBLE-RESEARCH-PROJECT</a:t>
+            </a:r>
+            <a:endParaRPr lang="pl-PL" sz="1400" b="1" dirty="0">
+              <a:latin typeface="Calibri" panose="020F0502020204030204" pitchFamily="34" charset="0"/>
+              <a:ea typeface="Calibri" panose="020F0502020204030204" pitchFamily="34" charset="0"/>
+              <a:cs typeface="Calibri" panose="020F0502020204030204" pitchFamily="34" charset="0"/>
+            </a:endParaRPr>
+          </a:p>
+        </p:txBody>
+      </p:sp>
+      <p:cxnSp>
+        <p:nvCxnSpPr>
+          <p:cNvPr id="18" name="Straight Connector 17">
+            <a:extLst>
+              <a:ext uri="{FF2B5EF4-FFF2-40B4-BE49-F238E27FC236}">
+                <a16:creationId xmlns:a16="http://schemas.microsoft.com/office/drawing/2014/main" id="{726FF187-3700-8BF6-4C42-352C4E2C0442}"/>
+              </a:ext>
+            </a:extLst>
+          </p:cNvPr>
+          <p:cNvCxnSpPr>
+            <a:cxnSpLocks/>
+          </p:cNvCxnSpPr>
+          <p:nvPr/>
+        </p:nvCxnSpPr>
+        <p:spPr>
+          <a:xfrm>
+            <a:off x="3667208" y="1932814"/>
+            <a:ext cx="1060174" cy="0"/>
+          </a:xfrm>
+          <a:prstGeom prst="line">
+            <a:avLst/>
+          </a:prstGeom>
+        </p:spPr>
+        <p:style>
+          <a:lnRef idx="2">
+            <a:schemeClr val="dk1"/>
+          </a:lnRef>
+          <a:fillRef idx="0">
+            <a:schemeClr val="dk1"/>
+          </a:fillRef>
+          <a:effectRef idx="1">
+            <a:schemeClr val="dk1"/>
+          </a:effectRef>
+          <a:fontRef idx="minor">
+            <a:schemeClr val="tx1"/>
+          </a:fontRef>
+        </p:style>
+      </p:cxnSp>
+      <p:pic>
+        <p:nvPicPr>
+          <p:cNvPr id="20" name="Picture 4" descr="Free Folder SVG, PNG Icon, Symbol. Download Image.">
+            <a:extLst>
+              <a:ext uri="{FF2B5EF4-FFF2-40B4-BE49-F238E27FC236}">
+                <a16:creationId xmlns:a16="http://schemas.microsoft.com/office/drawing/2014/main" id="{1AF550D5-7676-7DAE-013B-D62F56686644}"/>
+              </a:ext>
+            </a:extLst>
+          </p:cNvPr>
+          <p:cNvPicPr>
+            <a:picLocks noChangeAspect="1" noChangeArrowheads="1"/>
+          </p:cNvPicPr>
+          <p:nvPr/>
+        </p:nvPicPr>
+        <p:blipFill>
+          <a:blip r:embed="rId2">
+            <a:extLst>
+              <a:ext uri="{28A0092B-C50C-407E-A947-70E740481C1C}">
+                <a14:useLocalDpi xmlns:a14="http://schemas.microsoft.com/office/drawing/2010/main" val="0"/>
+              </a:ext>
+            </a:extLst>
+          </a:blip>
+          <a:srcRect/>
+          <a:stretch>
+            <a:fillRect/>
+          </a:stretch>
+        </p:blipFill>
+        <p:spPr bwMode="auto">
+          <a:xfrm>
+            <a:off x="4815720" y="1614079"/>
+            <a:ext cx="478895" cy="478895"/>
+          </a:xfrm>
+          <a:prstGeom prst="rect">
+            <a:avLst/>
+          </a:prstGeom>
+          <a:noFill/>
+          <a:extLst>
+            <a:ext uri="{909E8E84-426E-40DD-AFC4-6F175D3DCCD1}">
+              <a14:hiddenFill xmlns:a14="http://schemas.microsoft.com/office/drawing/2010/main">
+                <a:solidFill>
+                  <a:srgbClr val="FFFFFF"/>
+                </a:solidFill>
+              </a14:hiddenFill>
+            </a:ext>
+          </a:extLst>
+        </p:spPr>
+      </p:pic>
+      <p:sp>
+        <p:nvSpPr>
+          <p:cNvPr id="22" name="Rectangle 21">
+            <a:extLst>
+              <a:ext uri="{FF2B5EF4-FFF2-40B4-BE49-F238E27FC236}">
+                <a16:creationId xmlns:a16="http://schemas.microsoft.com/office/drawing/2014/main" id="{E2F9086D-962F-1F96-BCFC-C95471D092D7}"/>
+              </a:ext>
+            </a:extLst>
+          </p:cNvPr>
+          <p:cNvSpPr/>
+          <p:nvPr/>
+        </p:nvSpPr>
+        <p:spPr>
+          <a:xfrm>
+            <a:off x="4764796" y="1677448"/>
+            <a:ext cx="580742" cy="377632"/>
+          </a:xfrm>
+          <a:prstGeom prst="rect">
+            <a:avLst/>
+          </a:prstGeom>
+          <a:noFill/>
+          <a:ln>
+            <a:noFill/>
+          </a:ln>
+        </p:spPr>
+        <p:style>
+          <a:lnRef idx="0">
+            <a:scrgbClr r="0" g="0" b="0"/>
+          </a:lnRef>
+          <a:fillRef idx="0">
+            <a:scrgbClr r="0" g="0" b="0"/>
+          </a:fillRef>
+          <a:effectRef idx="0">
+            <a:scrgbClr r="0" g="0" b="0"/>
+          </a:effectRef>
+          <a:fontRef idx="minor">
+            <a:schemeClr val="dk1"/>
+          </a:fontRef>
+        </p:style>
+        <p:txBody>
+          <a:bodyPr rtlCol="0" anchor="ctr"/>
+          <a:lstStyle/>
+          <a:p>
+            <a:pPr algn="ctr"/>
+            <a:r>
+              <a:rPr lang="en-US" sz="1400" b="1" dirty="0">
+                <a:latin typeface="Calibri" panose="020F0502020204030204" pitchFamily="34" charset="0"/>
+                <a:ea typeface="Calibri" panose="020F0502020204030204" pitchFamily="34" charset="0"/>
+                <a:cs typeface="Calibri" panose="020F0502020204030204" pitchFamily="34" charset="0"/>
+              </a:rPr>
+              <a:t>data</a:t>
+            </a:r>
+            <a:endParaRPr lang="pl-PL" sz="1400" b="1" dirty="0">
+              <a:latin typeface="Calibri" panose="020F0502020204030204" pitchFamily="34" charset="0"/>
+              <a:ea typeface="Calibri" panose="020F0502020204030204" pitchFamily="34" charset="0"/>
+              <a:cs typeface="Calibri" panose="020F0502020204030204" pitchFamily="34" charset="0"/>
+            </a:endParaRPr>
+          </a:p>
+        </p:txBody>
+      </p:sp>
+      <p:cxnSp>
+        <p:nvCxnSpPr>
+          <p:cNvPr id="31" name="Straight Connector 30">
+            <a:extLst>
+              <a:ext uri="{FF2B5EF4-FFF2-40B4-BE49-F238E27FC236}">
+                <a16:creationId xmlns:a16="http://schemas.microsoft.com/office/drawing/2014/main" id="{BD6BB589-65DF-74D6-2423-D4EFBA38D357}"/>
+              </a:ext>
+            </a:extLst>
+          </p:cNvPr>
+          <p:cNvCxnSpPr>
+            <a:cxnSpLocks/>
+          </p:cNvCxnSpPr>
+          <p:nvPr/>
+        </p:nvCxnSpPr>
+        <p:spPr>
+          <a:xfrm>
+            <a:off x="3653691" y="2538362"/>
+            <a:ext cx="1060174" cy="0"/>
+          </a:xfrm>
+          <a:prstGeom prst="line">
+            <a:avLst/>
+          </a:prstGeom>
+        </p:spPr>
+        <p:style>
+          <a:lnRef idx="2">
+            <a:schemeClr val="dk1"/>
+          </a:lnRef>
+          <a:fillRef idx="0">
+            <a:schemeClr val="dk1"/>
+          </a:fillRef>
+          <a:effectRef idx="1">
+            <a:schemeClr val="dk1"/>
+          </a:effectRef>
+          <a:fontRef idx="minor">
+            <a:schemeClr val="tx1"/>
+          </a:fontRef>
+        </p:style>
+      </p:cxnSp>
+      <p:pic>
+        <p:nvPicPr>
+          <p:cNvPr id="34" name="Picture 4" descr="Free Folder SVG, PNG Icon, Symbol. Download Image.">
+            <a:extLst>
+              <a:ext uri="{FF2B5EF4-FFF2-40B4-BE49-F238E27FC236}">
+                <a16:creationId xmlns:a16="http://schemas.microsoft.com/office/drawing/2014/main" id="{2A948D0E-15AD-3D97-F92C-54F14BF34A94}"/>
+              </a:ext>
+            </a:extLst>
+          </p:cNvPr>
+          <p:cNvPicPr>
+            <a:picLocks noChangeAspect="1" noChangeArrowheads="1"/>
+          </p:cNvPicPr>
+          <p:nvPr/>
+        </p:nvPicPr>
+        <p:blipFill>
+          <a:blip r:embed="rId2">
+            <a:extLst>
+              <a:ext uri="{28A0092B-C50C-407E-A947-70E740481C1C}">
+                <a14:useLocalDpi xmlns:a14="http://schemas.microsoft.com/office/drawing/2010/main" val="0"/>
+              </a:ext>
+            </a:extLst>
+          </a:blip>
+          <a:srcRect/>
+          <a:stretch>
+            <a:fillRect/>
+          </a:stretch>
+        </p:blipFill>
+        <p:spPr bwMode="auto">
+          <a:xfrm>
+            <a:off x="4815720" y="2316599"/>
+            <a:ext cx="478895" cy="478895"/>
+          </a:xfrm>
+          <a:prstGeom prst="rect">
+            <a:avLst/>
+          </a:prstGeom>
+          <a:noFill/>
+          <a:extLst>
+            <a:ext uri="{909E8E84-426E-40DD-AFC4-6F175D3DCCD1}">
+              <a14:hiddenFill xmlns:a14="http://schemas.microsoft.com/office/drawing/2010/main">
+                <a:solidFill>
+                  <a:srgbClr val="FFFFFF"/>
+                </a:solidFill>
+              </a14:hiddenFill>
+            </a:ext>
+          </a:extLst>
+        </p:spPr>
+      </p:pic>
+      <p:sp>
+        <p:nvSpPr>
+          <p:cNvPr id="33" name="Rectangle 32">
+            <a:extLst>
+              <a:ext uri="{FF2B5EF4-FFF2-40B4-BE49-F238E27FC236}">
+                <a16:creationId xmlns:a16="http://schemas.microsoft.com/office/drawing/2014/main" id="{26A022FB-98E7-8AFB-9C76-12C363275196}"/>
+              </a:ext>
+            </a:extLst>
+          </p:cNvPr>
+          <p:cNvSpPr/>
+          <p:nvPr/>
+        </p:nvSpPr>
+        <p:spPr>
+          <a:xfrm>
+            <a:off x="4640288" y="2418616"/>
+            <a:ext cx="876058" cy="342153"/>
+          </a:xfrm>
+          <a:prstGeom prst="rect">
+            <a:avLst/>
+          </a:prstGeom>
+          <a:noFill/>
+          <a:ln>
+            <a:noFill/>
+          </a:ln>
+        </p:spPr>
+        <p:style>
+          <a:lnRef idx="0">
+            <a:scrgbClr r="0" g="0" b="0"/>
+          </a:lnRef>
+          <a:fillRef idx="0">
+            <a:scrgbClr r="0" g="0" b="0"/>
+          </a:fillRef>
+          <a:effectRef idx="0">
+            <a:scrgbClr r="0" g="0" b="0"/>
+          </a:effectRef>
+          <a:fontRef idx="minor">
+            <a:schemeClr val="dk1"/>
+          </a:fontRef>
+        </p:style>
+        <p:txBody>
+          <a:bodyPr rtlCol="0" anchor="ctr"/>
+          <a:lstStyle/>
+          <a:p>
+            <a:pPr algn="ctr"/>
+            <a:r>
+              <a:rPr lang="en-US" sz="1400" b="1" dirty="0">
+                <a:latin typeface="Calibri" panose="020F0502020204030204" pitchFamily="34" charset="0"/>
+                <a:ea typeface="Calibri" panose="020F0502020204030204" pitchFamily="34" charset="0"/>
+                <a:cs typeface="Calibri" panose="020F0502020204030204" pitchFamily="34" charset="0"/>
+              </a:rPr>
+              <a:t>utils</a:t>
+            </a:r>
+            <a:endParaRPr lang="pl-PL" sz="1400" b="1" dirty="0">
+              <a:latin typeface="Calibri" panose="020F0502020204030204" pitchFamily="34" charset="0"/>
+              <a:ea typeface="Calibri" panose="020F0502020204030204" pitchFamily="34" charset="0"/>
+              <a:cs typeface="Calibri" panose="020F0502020204030204" pitchFamily="34" charset="0"/>
+            </a:endParaRPr>
+          </a:p>
+        </p:txBody>
+      </p:sp>
+      <p:cxnSp>
+        <p:nvCxnSpPr>
+          <p:cNvPr id="35" name="Straight Arrow Connector 34">
+            <a:extLst>
+              <a:ext uri="{FF2B5EF4-FFF2-40B4-BE49-F238E27FC236}">
+                <a16:creationId xmlns:a16="http://schemas.microsoft.com/office/drawing/2014/main" id="{4B304FD3-6BAF-8DB6-DB66-A1457A57787E}"/>
+              </a:ext>
+            </a:extLst>
+          </p:cNvPr>
+          <p:cNvCxnSpPr>
+            <a:cxnSpLocks/>
+          </p:cNvCxnSpPr>
+          <p:nvPr/>
+        </p:nvCxnSpPr>
+        <p:spPr>
+          <a:xfrm flipV="1">
+            <a:off x="5323237" y="2595807"/>
+            <a:ext cx="737082" cy="12738"/>
+          </a:xfrm>
+          <a:prstGeom prst="straightConnector1">
+            <a:avLst/>
+          </a:prstGeom>
+          <a:ln w="9525">
+            <a:prstDash val="dash"/>
+            <a:tailEnd type="triangle"/>
+          </a:ln>
+        </p:spPr>
+        <p:style>
+          <a:lnRef idx="2">
+            <a:schemeClr val="dk1"/>
+          </a:lnRef>
+          <a:fillRef idx="0">
+            <a:schemeClr val="dk1"/>
+          </a:fillRef>
+          <a:effectRef idx="1">
+            <a:schemeClr val="dk1"/>
+          </a:effectRef>
+          <a:fontRef idx="minor">
+            <a:schemeClr val="tx1"/>
+          </a:fontRef>
+        </p:style>
+      </p:cxnSp>
+      <p:cxnSp>
+        <p:nvCxnSpPr>
+          <p:cNvPr id="37" name="Straight Connector 36">
+            <a:extLst>
+              <a:ext uri="{FF2B5EF4-FFF2-40B4-BE49-F238E27FC236}">
+                <a16:creationId xmlns:a16="http://schemas.microsoft.com/office/drawing/2014/main" id="{2E2F83B3-D6A9-DCAB-4D96-6789AF9CC749}"/>
+              </a:ext>
+            </a:extLst>
+          </p:cNvPr>
+          <p:cNvCxnSpPr>
+            <a:cxnSpLocks/>
+          </p:cNvCxnSpPr>
+          <p:nvPr/>
+        </p:nvCxnSpPr>
+        <p:spPr>
+          <a:xfrm>
+            <a:off x="3653691" y="3176898"/>
+            <a:ext cx="1060174" cy="0"/>
+          </a:xfrm>
+          <a:prstGeom prst="line">
+            <a:avLst/>
+          </a:prstGeom>
+        </p:spPr>
+        <p:style>
+          <a:lnRef idx="2">
+            <a:schemeClr val="dk1"/>
+          </a:lnRef>
+          <a:fillRef idx="0">
+            <a:schemeClr val="dk1"/>
+          </a:fillRef>
+          <a:effectRef idx="1">
+            <a:schemeClr val="dk1"/>
+          </a:effectRef>
+          <a:fontRef idx="minor">
+            <a:schemeClr val="tx1"/>
+          </a:fontRef>
+        </p:style>
+      </p:cxnSp>
+      <p:pic>
+        <p:nvPicPr>
+          <p:cNvPr id="38" name="Picture 4" descr="Free Folder SVG, PNG Icon, Symbol. Download Image.">
+            <a:extLst>
+              <a:ext uri="{FF2B5EF4-FFF2-40B4-BE49-F238E27FC236}">
+                <a16:creationId xmlns:a16="http://schemas.microsoft.com/office/drawing/2014/main" id="{7EE089F5-6501-0D1A-0E39-1D973049F525}"/>
+              </a:ext>
+            </a:extLst>
+          </p:cNvPr>
+          <p:cNvPicPr>
+            <a:picLocks noChangeAspect="1" noChangeArrowheads="1"/>
+          </p:cNvPicPr>
+          <p:nvPr/>
+        </p:nvPicPr>
+        <p:blipFill>
+          <a:blip r:embed="rId2">
+            <a:extLst>
+              <a:ext uri="{28A0092B-C50C-407E-A947-70E740481C1C}">
+                <a14:useLocalDpi xmlns:a14="http://schemas.microsoft.com/office/drawing/2010/main" val="0"/>
+              </a:ext>
+            </a:extLst>
+          </a:blip>
+          <a:srcRect/>
+          <a:stretch>
+            <a:fillRect/>
+          </a:stretch>
+        </p:blipFill>
+        <p:spPr bwMode="auto">
+          <a:xfrm>
+            <a:off x="4810168" y="2986519"/>
+            <a:ext cx="478895" cy="478895"/>
+          </a:xfrm>
+          <a:prstGeom prst="rect">
+            <a:avLst/>
+          </a:prstGeom>
+          <a:noFill/>
+          <a:extLst>
+            <a:ext uri="{909E8E84-426E-40DD-AFC4-6F175D3DCCD1}">
+              <a14:hiddenFill xmlns:a14="http://schemas.microsoft.com/office/drawing/2010/main">
+                <a:solidFill>
+                  <a:srgbClr val="FFFFFF"/>
+                </a:solidFill>
+              </a14:hiddenFill>
+            </a:ext>
+          </a:extLst>
+        </p:spPr>
+      </p:pic>
+      <p:sp>
+        <p:nvSpPr>
+          <p:cNvPr id="43" name="Rectangle 42">
+            <a:extLst>
+              <a:ext uri="{FF2B5EF4-FFF2-40B4-BE49-F238E27FC236}">
+                <a16:creationId xmlns:a16="http://schemas.microsoft.com/office/drawing/2014/main" id="{1D8D9995-C6B6-FEE7-EEAB-0F13316278B3}"/>
+              </a:ext>
+            </a:extLst>
+          </p:cNvPr>
+          <p:cNvSpPr/>
+          <p:nvPr/>
+        </p:nvSpPr>
+        <p:spPr>
+          <a:xfrm>
+            <a:off x="4373106" y="3210738"/>
+            <a:ext cx="1410421" cy="202178"/>
+          </a:xfrm>
+          <a:prstGeom prst="rect">
+            <a:avLst/>
+          </a:prstGeom>
+          <a:noFill/>
+          <a:ln>
+            <a:noFill/>
+          </a:ln>
+        </p:spPr>
+        <p:style>
+          <a:lnRef idx="0">
+            <a:scrgbClr r="0" g="0" b="0"/>
+          </a:lnRef>
+          <a:fillRef idx="0">
+            <a:scrgbClr r="0" g="0" b="0"/>
+          </a:fillRef>
+          <a:effectRef idx="0">
+            <a:scrgbClr r="0" g="0" b="0"/>
+          </a:effectRef>
+          <a:fontRef idx="minor">
+            <a:schemeClr val="dk1"/>
+          </a:fontRef>
+        </p:style>
+        <p:txBody>
+          <a:bodyPr rtlCol="0" anchor="ctr"/>
+          <a:lstStyle/>
+          <a:p>
+            <a:pPr algn="ctr"/>
+            <a:r>
+              <a:rPr lang="en-US" sz="1400" b="1" dirty="0">
+                <a:latin typeface="Calibri" panose="020F0502020204030204" pitchFamily="34" charset="0"/>
+                <a:ea typeface="Calibri" panose="020F0502020204030204" pitchFamily="34" charset="0"/>
+                <a:cs typeface="Calibri" panose="020F0502020204030204" pitchFamily="34" charset="0"/>
+              </a:rPr>
+              <a:t>documentation</a:t>
+            </a:r>
+            <a:endParaRPr lang="pl-PL" sz="1400" b="1" dirty="0">
+              <a:latin typeface="Calibri" panose="020F0502020204030204" pitchFamily="34" charset="0"/>
+              <a:ea typeface="Calibri" panose="020F0502020204030204" pitchFamily="34" charset="0"/>
+              <a:cs typeface="Calibri" panose="020F0502020204030204" pitchFamily="34" charset="0"/>
+            </a:endParaRPr>
+          </a:p>
+        </p:txBody>
+      </p:sp>
+      <p:cxnSp>
+        <p:nvCxnSpPr>
+          <p:cNvPr id="44" name="Straight Arrow Connector 43">
+            <a:extLst>
+              <a:ext uri="{FF2B5EF4-FFF2-40B4-BE49-F238E27FC236}">
+                <a16:creationId xmlns:a16="http://schemas.microsoft.com/office/drawing/2014/main" id="{F322F698-D907-5ECE-AF74-24BC3DCA95E9}"/>
+              </a:ext>
+            </a:extLst>
+          </p:cNvPr>
+          <p:cNvCxnSpPr>
+            <a:cxnSpLocks/>
+          </p:cNvCxnSpPr>
+          <p:nvPr/>
+        </p:nvCxnSpPr>
+        <p:spPr>
+          <a:xfrm flipV="1">
+            <a:off x="5317767" y="3187450"/>
+            <a:ext cx="737082" cy="12738"/>
+          </a:xfrm>
+          <a:prstGeom prst="straightConnector1">
+            <a:avLst/>
+          </a:prstGeom>
+          <a:ln w="9525">
+            <a:prstDash val="dash"/>
+            <a:tailEnd type="triangle"/>
+          </a:ln>
+        </p:spPr>
+        <p:style>
+          <a:lnRef idx="2">
+            <a:schemeClr val="dk1"/>
+          </a:lnRef>
+          <a:fillRef idx="0">
+            <a:schemeClr val="dk1"/>
+          </a:fillRef>
+          <a:effectRef idx="1">
+            <a:schemeClr val="dk1"/>
+          </a:effectRef>
+          <a:fontRef idx="minor">
+            <a:schemeClr val="tx1"/>
+          </a:fontRef>
+        </p:style>
+      </p:cxnSp>
+      <p:sp>
+        <p:nvSpPr>
+          <p:cNvPr id="46" name="Rectangle 45">
+            <a:extLst>
+              <a:ext uri="{FF2B5EF4-FFF2-40B4-BE49-F238E27FC236}">
+                <a16:creationId xmlns:a16="http://schemas.microsoft.com/office/drawing/2014/main" id="{DFC09B2C-BA52-49C6-1E16-29FB6CC00728}"/>
+              </a:ext>
+            </a:extLst>
+          </p:cNvPr>
+          <p:cNvSpPr/>
+          <p:nvPr/>
+        </p:nvSpPr>
+        <p:spPr>
+          <a:xfrm>
+            <a:off x="6082619" y="3061304"/>
+            <a:ext cx="3346211" cy="298868"/>
+          </a:xfrm>
+          <a:prstGeom prst="rect">
+            <a:avLst/>
+          </a:prstGeom>
+          <a:noFill/>
+          <a:ln>
+            <a:noFill/>
+          </a:ln>
+        </p:spPr>
+        <p:style>
+          <a:lnRef idx="0">
+            <a:scrgbClr r="0" g="0" b="0"/>
+          </a:lnRef>
+          <a:fillRef idx="0">
+            <a:scrgbClr r="0" g="0" b="0"/>
+          </a:fillRef>
+          <a:effectRef idx="0">
+            <a:scrgbClr r="0" g="0" b="0"/>
+          </a:effectRef>
+          <a:fontRef idx="minor">
+            <a:schemeClr val="dk1"/>
+          </a:fontRef>
+        </p:style>
+        <p:txBody>
+          <a:bodyPr rtlCol="0" anchor="ctr"/>
+          <a:lstStyle/>
+          <a:p>
+            <a:r>
+              <a:rPr lang="en-US" sz="1400" b="1" dirty="0">
+                <a:latin typeface="Calibri" panose="020F0502020204030204" pitchFamily="34" charset="0"/>
+                <a:ea typeface="Calibri" panose="020F0502020204030204" pitchFamily="34" charset="0"/>
+                <a:cs typeface="Calibri" panose="020F0502020204030204" pitchFamily="34" charset="0"/>
+              </a:rPr>
+              <a:t>Documentation materials</a:t>
+            </a:r>
+            <a:endParaRPr lang="pl-PL" sz="1400" b="1" dirty="0">
+              <a:latin typeface="Calibri" panose="020F0502020204030204" pitchFamily="34" charset="0"/>
+              <a:ea typeface="Calibri" panose="020F0502020204030204" pitchFamily="34" charset="0"/>
+              <a:cs typeface="Calibri" panose="020F0502020204030204" pitchFamily="34" charset="0"/>
+            </a:endParaRPr>
+          </a:p>
+        </p:txBody>
+      </p:sp>
+      <p:pic>
+        <p:nvPicPr>
+          <p:cNvPr id="48" name="Picture 4" descr="Free Folder SVG, PNG Icon, Symbol. Download Image.">
+            <a:extLst>
+              <a:ext uri="{FF2B5EF4-FFF2-40B4-BE49-F238E27FC236}">
+                <a16:creationId xmlns:a16="http://schemas.microsoft.com/office/drawing/2014/main" id="{F00786BA-DB50-82E7-6080-4E89709289E5}"/>
+              </a:ext>
+            </a:extLst>
+          </p:cNvPr>
+          <p:cNvPicPr>
+            <a:picLocks noChangeAspect="1" noChangeArrowheads="1"/>
+          </p:cNvPicPr>
+          <p:nvPr/>
+        </p:nvPicPr>
+        <p:blipFill>
+          <a:blip r:embed="rId2">
+            <a:extLst>
+              <a:ext uri="{28A0092B-C50C-407E-A947-70E740481C1C}">
+                <a14:useLocalDpi xmlns:a14="http://schemas.microsoft.com/office/drawing/2010/main" val="0"/>
+              </a:ext>
+            </a:extLst>
+          </a:blip>
+          <a:srcRect/>
+          <a:stretch>
+            <a:fillRect/>
+          </a:stretch>
+        </p:blipFill>
+        <p:spPr bwMode="auto">
+          <a:xfrm>
+            <a:off x="4810169" y="3654877"/>
+            <a:ext cx="478895" cy="478895"/>
+          </a:xfrm>
+          <a:prstGeom prst="rect">
+            <a:avLst/>
+          </a:prstGeom>
+          <a:noFill/>
+          <a:extLst>
+            <a:ext uri="{909E8E84-426E-40DD-AFC4-6F175D3DCCD1}">
+              <a14:hiddenFill xmlns:a14="http://schemas.microsoft.com/office/drawing/2010/main">
+                <a:solidFill>
+                  <a:srgbClr val="FFFFFF"/>
+                </a:solidFill>
+              </a14:hiddenFill>
+            </a:ext>
+          </a:extLst>
+        </p:spPr>
+      </p:pic>
+      <p:cxnSp>
+        <p:nvCxnSpPr>
+          <p:cNvPr id="49" name="Straight Connector 48">
+            <a:extLst>
+              <a:ext uri="{FF2B5EF4-FFF2-40B4-BE49-F238E27FC236}">
+                <a16:creationId xmlns:a16="http://schemas.microsoft.com/office/drawing/2014/main" id="{B3BB3190-EA93-CC5A-814C-E7AA9E133751}"/>
+              </a:ext>
+            </a:extLst>
+          </p:cNvPr>
+          <p:cNvCxnSpPr>
+            <a:cxnSpLocks/>
+          </p:cNvCxnSpPr>
+          <p:nvPr/>
+        </p:nvCxnSpPr>
+        <p:spPr>
+          <a:xfrm>
+            <a:off x="3667208" y="3840031"/>
+            <a:ext cx="1060174" cy="0"/>
+          </a:xfrm>
+          <a:prstGeom prst="line">
+            <a:avLst/>
+          </a:prstGeom>
+        </p:spPr>
+        <p:style>
+          <a:lnRef idx="2">
+            <a:schemeClr val="dk1"/>
+          </a:lnRef>
+          <a:fillRef idx="0">
+            <a:schemeClr val="dk1"/>
+          </a:fillRef>
+          <a:effectRef idx="1">
+            <a:schemeClr val="dk1"/>
+          </a:effectRef>
+          <a:fontRef idx="minor">
+            <a:schemeClr val="tx1"/>
+          </a:fontRef>
+        </p:style>
+      </p:cxnSp>
+      <p:sp>
+        <p:nvSpPr>
+          <p:cNvPr id="50" name="Rectangle 49">
+            <a:extLst>
+              <a:ext uri="{FF2B5EF4-FFF2-40B4-BE49-F238E27FC236}">
+                <a16:creationId xmlns:a16="http://schemas.microsoft.com/office/drawing/2014/main" id="{88D757D6-B6DE-5EE0-72FA-C2B08ADA806E}"/>
+              </a:ext>
+            </a:extLst>
+          </p:cNvPr>
+          <p:cNvSpPr/>
+          <p:nvPr/>
+        </p:nvSpPr>
+        <p:spPr>
+          <a:xfrm>
+            <a:off x="4373105" y="3779569"/>
+            <a:ext cx="1410421" cy="202178"/>
+          </a:xfrm>
+          <a:prstGeom prst="rect">
+            <a:avLst/>
+          </a:prstGeom>
+          <a:noFill/>
+          <a:ln>
+            <a:noFill/>
+          </a:ln>
+        </p:spPr>
+        <p:style>
+          <a:lnRef idx="0">
+            <a:scrgbClr r="0" g="0" b="0"/>
+          </a:lnRef>
+          <a:fillRef idx="0">
+            <a:scrgbClr r="0" g="0" b="0"/>
+          </a:fillRef>
+          <a:effectRef idx="0">
+            <a:scrgbClr r="0" g="0" b="0"/>
+          </a:effectRef>
+          <a:fontRef idx="minor">
+            <a:schemeClr val="dk1"/>
+          </a:fontRef>
+        </p:style>
+        <p:txBody>
+          <a:bodyPr rtlCol="0" anchor="ctr"/>
+          <a:lstStyle/>
+          <a:p>
+            <a:pPr algn="ctr"/>
+            <a:r>
+              <a:rPr lang="en-US" sz="1400" b="1" dirty="0">
+                <a:latin typeface="Calibri" panose="020F0502020204030204" pitchFamily="34" charset="0"/>
+                <a:ea typeface="Calibri" panose="020F0502020204030204" pitchFamily="34" charset="0"/>
+                <a:cs typeface="Calibri" panose="020F0502020204030204" pitchFamily="34" charset="0"/>
+              </a:rPr>
+              <a:t>images</a:t>
+            </a:r>
+            <a:endParaRPr lang="pl-PL" sz="1400" b="1" dirty="0">
+              <a:latin typeface="Calibri" panose="020F0502020204030204" pitchFamily="34" charset="0"/>
+              <a:ea typeface="Calibri" panose="020F0502020204030204" pitchFamily="34" charset="0"/>
+              <a:cs typeface="Calibri" panose="020F0502020204030204" pitchFamily="34" charset="0"/>
+            </a:endParaRPr>
+          </a:p>
+        </p:txBody>
+      </p:sp>
+      <p:cxnSp>
+        <p:nvCxnSpPr>
+          <p:cNvPr id="51" name="Straight Arrow Connector 50">
+            <a:extLst>
+              <a:ext uri="{FF2B5EF4-FFF2-40B4-BE49-F238E27FC236}">
+                <a16:creationId xmlns:a16="http://schemas.microsoft.com/office/drawing/2014/main" id="{A26CFABD-ED4F-1861-AFDB-CCF515B4036E}"/>
+              </a:ext>
+            </a:extLst>
+          </p:cNvPr>
+          <p:cNvCxnSpPr>
+            <a:cxnSpLocks/>
+          </p:cNvCxnSpPr>
+          <p:nvPr/>
+        </p:nvCxnSpPr>
+        <p:spPr>
+          <a:xfrm flipV="1">
+            <a:off x="5345538" y="3874289"/>
+            <a:ext cx="737082" cy="12738"/>
+          </a:xfrm>
+          <a:prstGeom prst="straightConnector1">
+            <a:avLst/>
+          </a:prstGeom>
+          <a:ln w="9525">
+            <a:prstDash val="dash"/>
+            <a:tailEnd type="triangle"/>
+          </a:ln>
+        </p:spPr>
+        <p:style>
+          <a:lnRef idx="2">
+            <a:schemeClr val="dk1"/>
+          </a:lnRef>
+          <a:fillRef idx="0">
+            <a:schemeClr val="dk1"/>
+          </a:fillRef>
+          <a:effectRef idx="1">
+            <a:schemeClr val="dk1"/>
+          </a:effectRef>
+          <a:fontRef idx="minor">
+            <a:schemeClr val="tx1"/>
+          </a:fontRef>
+        </p:style>
+      </p:cxnSp>
+      <p:sp>
+        <p:nvSpPr>
+          <p:cNvPr id="52" name="Rectangle 51">
+            <a:extLst>
+              <a:ext uri="{FF2B5EF4-FFF2-40B4-BE49-F238E27FC236}">
+                <a16:creationId xmlns:a16="http://schemas.microsoft.com/office/drawing/2014/main" id="{AAA2DD87-40FF-C286-5B69-7FE7F025728D}"/>
+              </a:ext>
+            </a:extLst>
+          </p:cNvPr>
+          <p:cNvSpPr/>
+          <p:nvPr/>
+        </p:nvSpPr>
+        <p:spPr>
+          <a:xfrm>
+            <a:off x="6108501" y="3762360"/>
+            <a:ext cx="2913873" cy="313650"/>
+          </a:xfrm>
+          <a:prstGeom prst="rect">
+            <a:avLst/>
+          </a:prstGeom>
+          <a:noFill/>
+          <a:ln>
+            <a:noFill/>
+          </a:ln>
+        </p:spPr>
+        <p:style>
+          <a:lnRef idx="0">
+            <a:scrgbClr r="0" g="0" b="0"/>
+          </a:lnRef>
+          <a:fillRef idx="0">
+            <a:scrgbClr r="0" g="0" b="0"/>
+          </a:fillRef>
+          <a:effectRef idx="0">
+            <a:scrgbClr r="0" g="0" b="0"/>
+          </a:effectRef>
+          <a:fontRef idx="minor">
+            <a:schemeClr val="dk1"/>
+          </a:fontRef>
+        </p:style>
+        <p:txBody>
+          <a:bodyPr rtlCol="0" anchor="ctr"/>
+          <a:lstStyle/>
+          <a:p>
+            <a:r>
+              <a:rPr lang="en-US" sz="1400" b="1" dirty="0">
+                <a:latin typeface="Calibri" panose="020F0502020204030204" pitchFamily="34" charset="0"/>
+                <a:ea typeface="Calibri" panose="020F0502020204030204" pitchFamily="34" charset="0"/>
+                <a:cs typeface="Calibri" panose="020F0502020204030204" pitchFamily="34" charset="0"/>
+              </a:rPr>
+              <a:t>Images for the </a:t>
+            </a:r>
+            <a:r>
+              <a:rPr lang="en-US" sz="1400" b="1" dirty="0" err="1">
+                <a:latin typeface="Calibri" panose="020F0502020204030204" pitchFamily="34" charset="0"/>
+                <a:ea typeface="Calibri" panose="020F0502020204030204" pitchFamily="34" charset="0"/>
+                <a:cs typeface="Calibri" panose="020F0502020204030204" pitchFamily="34" charset="0"/>
+              </a:rPr>
+              <a:t>streamlit</a:t>
+            </a:r>
+            <a:r>
+              <a:rPr lang="en-US" sz="1400" b="1" dirty="0">
+                <a:latin typeface="Calibri" panose="020F0502020204030204" pitchFamily="34" charset="0"/>
+                <a:ea typeface="Calibri" panose="020F0502020204030204" pitchFamily="34" charset="0"/>
+                <a:cs typeface="Calibri" panose="020F0502020204030204" pitchFamily="34" charset="0"/>
+              </a:rPr>
+              <a:t> app</a:t>
+            </a:r>
+            <a:endParaRPr lang="pl-PL" sz="1400" b="1" dirty="0">
+              <a:latin typeface="Calibri" panose="020F0502020204030204" pitchFamily="34" charset="0"/>
+              <a:ea typeface="Calibri" panose="020F0502020204030204" pitchFamily="34" charset="0"/>
+              <a:cs typeface="Calibri" panose="020F0502020204030204" pitchFamily="34" charset="0"/>
+            </a:endParaRPr>
+          </a:p>
+        </p:txBody>
+      </p:sp>
+      <p:cxnSp>
+        <p:nvCxnSpPr>
+          <p:cNvPr id="53" name="Straight Connector 52">
+            <a:extLst>
+              <a:ext uri="{FF2B5EF4-FFF2-40B4-BE49-F238E27FC236}">
+                <a16:creationId xmlns:a16="http://schemas.microsoft.com/office/drawing/2014/main" id="{FBAC2DF3-9492-002A-B1CB-22E353D9D8C5}"/>
+              </a:ext>
+            </a:extLst>
+          </p:cNvPr>
+          <p:cNvCxnSpPr>
+            <a:cxnSpLocks/>
+          </p:cNvCxnSpPr>
+          <p:nvPr/>
+        </p:nvCxnSpPr>
+        <p:spPr>
+          <a:xfrm>
+            <a:off x="3653691" y="4420694"/>
+            <a:ext cx="1060174" cy="0"/>
+          </a:xfrm>
+          <a:prstGeom prst="line">
+            <a:avLst/>
+          </a:prstGeom>
+        </p:spPr>
+        <p:style>
+          <a:lnRef idx="2">
+            <a:schemeClr val="dk1"/>
+          </a:lnRef>
+          <a:fillRef idx="0">
+            <a:schemeClr val="dk1"/>
+          </a:fillRef>
+          <a:effectRef idx="1">
+            <a:schemeClr val="dk1"/>
+          </a:effectRef>
+          <a:fontRef idx="minor">
+            <a:schemeClr val="tx1"/>
+          </a:fontRef>
+        </p:style>
+      </p:cxnSp>
+      <p:pic>
+        <p:nvPicPr>
+          <p:cNvPr id="54" name="Picture 4" descr="Free Folder SVG, PNG Icon, Symbol. Download Image.">
+            <a:extLst>
+              <a:ext uri="{FF2B5EF4-FFF2-40B4-BE49-F238E27FC236}">
+                <a16:creationId xmlns:a16="http://schemas.microsoft.com/office/drawing/2014/main" id="{0C506106-9F36-0E50-B784-2FE4A51E8009}"/>
+              </a:ext>
+            </a:extLst>
+          </p:cNvPr>
+          <p:cNvPicPr>
+            <a:picLocks noChangeAspect="1" noChangeArrowheads="1"/>
+          </p:cNvPicPr>
+          <p:nvPr/>
+        </p:nvPicPr>
+        <p:blipFill>
+          <a:blip r:embed="rId2">
+            <a:extLst>
+              <a:ext uri="{28A0092B-C50C-407E-A947-70E740481C1C}">
+                <a14:useLocalDpi xmlns:a14="http://schemas.microsoft.com/office/drawing/2010/main" val="0"/>
+              </a:ext>
+            </a:extLst>
+          </a:blip>
+          <a:srcRect/>
+          <a:stretch>
+            <a:fillRect/>
+          </a:stretch>
+        </p:blipFill>
+        <p:spPr bwMode="auto">
+          <a:xfrm>
+            <a:off x="4810168" y="4220308"/>
+            <a:ext cx="478895" cy="478895"/>
+          </a:xfrm>
+          <a:prstGeom prst="rect">
+            <a:avLst/>
+          </a:prstGeom>
+          <a:noFill/>
+          <a:extLst>
+            <a:ext uri="{909E8E84-426E-40DD-AFC4-6F175D3DCCD1}">
+              <a14:hiddenFill xmlns:a14="http://schemas.microsoft.com/office/drawing/2010/main">
+                <a:solidFill>
+                  <a:srgbClr val="FFFFFF"/>
+                </a:solidFill>
+              </a14:hiddenFill>
+            </a:ext>
+          </a:extLst>
+        </p:spPr>
+      </p:pic>
+      <p:sp>
+        <p:nvSpPr>
+          <p:cNvPr id="55" name="Rectangle 54">
+            <a:extLst>
+              <a:ext uri="{FF2B5EF4-FFF2-40B4-BE49-F238E27FC236}">
+                <a16:creationId xmlns:a16="http://schemas.microsoft.com/office/drawing/2014/main" id="{B2F07BCF-8FB6-1020-7080-C07AC8B771F8}"/>
+              </a:ext>
+            </a:extLst>
+          </p:cNvPr>
+          <p:cNvSpPr/>
+          <p:nvPr/>
+        </p:nvSpPr>
+        <p:spPr>
+          <a:xfrm>
+            <a:off x="4373104" y="4345000"/>
+            <a:ext cx="1410421" cy="202178"/>
+          </a:xfrm>
+          <a:prstGeom prst="rect">
+            <a:avLst/>
+          </a:prstGeom>
+          <a:noFill/>
+          <a:ln>
+            <a:noFill/>
+          </a:ln>
+        </p:spPr>
+        <p:style>
+          <a:lnRef idx="0">
+            <a:scrgbClr r="0" g="0" b="0"/>
+          </a:lnRef>
+          <a:fillRef idx="0">
+            <a:scrgbClr r="0" g="0" b="0"/>
+          </a:fillRef>
+          <a:effectRef idx="0">
+            <a:scrgbClr r="0" g="0" b="0"/>
+          </a:effectRef>
+          <a:fontRef idx="minor">
+            <a:schemeClr val="dk1"/>
+          </a:fontRef>
+        </p:style>
+        <p:txBody>
+          <a:bodyPr rtlCol="0" anchor="ctr"/>
+          <a:lstStyle/>
+          <a:p>
+            <a:pPr algn="ctr"/>
+            <a:r>
+              <a:rPr lang="en-US" sz="1400" b="1" dirty="0">
+                <a:latin typeface="Calibri" panose="020F0502020204030204" pitchFamily="34" charset="0"/>
+                <a:ea typeface="Calibri" panose="020F0502020204030204" pitchFamily="34" charset="0"/>
+                <a:cs typeface="Calibri" panose="020F0502020204030204" pitchFamily="34" charset="0"/>
+              </a:rPr>
+              <a:t>pages</a:t>
+            </a:r>
+            <a:endParaRPr lang="pl-PL" sz="1400" b="1" dirty="0">
+              <a:latin typeface="Calibri" panose="020F0502020204030204" pitchFamily="34" charset="0"/>
+              <a:ea typeface="Calibri" panose="020F0502020204030204" pitchFamily="34" charset="0"/>
+              <a:cs typeface="Calibri" panose="020F0502020204030204" pitchFamily="34" charset="0"/>
+            </a:endParaRPr>
+          </a:p>
+        </p:txBody>
+      </p:sp>
+      <p:cxnSp>
+        <p:nvCxnSpPr>
+          <p:cNvPr id="56" name="Straight Arrow Connector 55">
+            <a:extLst>
+              <a:ext uri="{FF2B5EF4-FFF2-40B4-BE49-F238E27FC236}">
+                <a16:creationId xmlns:a16="http://schemas.microsoft.com/office/drawing/2014/main" id="{8AFF5F55-3DBC-BEA7-9DA6-913DA4B6736A}"/>
+              </a:ext>
+            </a:extLst>
+          </p:cNvPr>
+          <p:cNvCxnSpPr>
+            <a:cxnSpLocks/>
+          </p:cNvCxnSpPr>
+          <p:nvPr/>
+        </p:nvCxnSpPr>
+        <p:spPr>
+          <a:xfrm flipV="1">
+            <a:off x="5345538" y="4476939"/>
+            <a:ext cx="737082" cy="12738"/>
+          </a:xfrm>
+          <a:prstGeom prst="straightConnector1">
+            <a:avLst/>
+          </a:prstGeom>
+          <a:ln w="9525">
+            <a:prstDash val="dash"/>
+            <a:tailEnd type="triangle"/>
+          </a:ln>
+        </p:spPr>
+        <p:style>
+          <a:lnRef idx="2">
+            <a:schemeClr val="dk1"/>
+          </a:lnRef>
+          <a:fillRef idx="0">
+            <a:schemeClr val="dk1"/>
+          </a:fillRef>
+          <a:effectRef idx="1">
+            <a:schemeClr val="dk1"/>
+          </a:effectRef>
+          <a:fontRef idx="minor">
+            <a:schemeClr val="tx1"/>
+          </a:fontRef>
+        </p:style>
+      </p:cxnSp>
+      <p:sp>
+        <p:nvSpPr>
+          <p:cNvPr id="57" name="Rectangle 56">
+            <a:extLst>
+              <a:ext uri="{FF2B5EF4-FFF2-40B4-BE49-F238E27FC236}">
+                <a16:creationId xmlns:a16="http://schemas.microsoft.com/office/drawing/2014/main" id="{E46CBF7B-A694-A95C-9B88-487C469B6430}"/>
+              </a:ext>
+            </a:extLst>
+          </p:cNvPr>
+          <p:cNvSpPr/>
+          <p:nvPr/>
+        </p:nvSpPr>
+        <p:spPr>
+          <a:xfrm>
+            <a:off x="6108501" y="4365010"/>
+            <a:ext cx="2913873" cy="313650"/>
+          </a:xfrm>
+          <a:prstGeom prst="rect">
+            <a:avLst/>
+          </a:prstGeom>
+          <a:noFill/>
+          <a:ln>
+            <a:noFill/>
+          </a:ln>
+        </p:spPr>
+        <p:style>
+          <a:lnRef idx="0">
+            <a:scrgbClr r="0" g="0" b="0"/>
+          </a:lnRef>
+          <a:fillRef idx="0">
+            <a:scrgbClr r="0" g="0" b="0"/>
+          </a:fillRef>
+          <a:effectRef idx="0">
+            <a:scrgbClr r="0" g="0" b="0"/>
+          </a:effectRef>
+          <a:fontRef idx="minor">
+            <a:schemeClr val="dk1"/>
+          </a:fontRef>
+        </p:style>
+        <p:txBody>
+          <a:bodyPr rtlCol="0" anchor="ctr"/>
+          <a:lstStyle/>
+          <a:p>
+            <a:r>
+              <a:rPr lang="en-US" sz="1400" b="1" dirty="0">
+                <a:latin typeface="Calibri" panose="020F0502020204030204" pitchFamily="34" charset="0"/>
+                <a:ea typeface="Calibri" panose="020F0502020204030204" pitchFamily="34" charset="0"/>
+                <a:cs typeface="Calibri" panose="020F0502020204030204" pitchFamily="34" charset="0"/>
+              </a:rPr>
+              <a:t>Python files for </a:t>
+            </a:r>
+            <a:r>
+              <a:rPr lang="en-US" sz="1400" b="1" dirty="0" err="1">
+                <a:latin typeface="Calibri" panose="020F0502020204030204" pitchFamily="34" charset="0"/>
+                <a:ea typeface="Calibri" panose="020F0502020204030204" pitchFamily="34" charset="0"/>
+                <a:cs typeface="Calibri" panose="020F0502020204030204" pitchFamily="34" charset="0"/>
+              </a:rPr>
+              <a:t>streamlit</a:t>
+            </a:r>
+            <a:r>
+              <a:rPr lang="en-US" sz="1400" b="1" dirty="0">
+                <a:latin typeface="Calibri" panose="020F0502020204030204" pitchFamily="34" charset="0"/>
+                <a:ea typeface="Calibri" panose="020F0502020204030204" pitchFamily="34" charset="0"/>
+                <a:cs typeface="Calibri" panose="020F0502020204030204" pitchFamily="34" charset="0"/>
+              </a:rPr>
+              <a:t> app</a:t>
+            </a:r>
+            <a:endParaRPr lang="pl-PL" sz="1400" b="1" dirty="0">
+              <a:latin typeface="Calibri" panose="020F0502020204030204" pitchFamily="34" charset="0"/>
+              <a:ea typeface="Calibri" panose="020F0502020204030204" pitchFamily="34" charset="0"/>
+              <a:cs typeface="Calibri" panose="020F0502020204030204" pitchFamily="34" charset="0"/>
+            </a:endParaRPr>
+          </a:p>
+        </p:txBody>
+      </p:sp>
+      <p:pic>
+        <p:nvPicPr>
+          <p:cNvPr id="59" name="Picture 4" descr="Free Folder SVG, PNG Icon, Symbol. Download Image.">
+            <a:extLst>
+              <a:ext uri="{FF2B5EF4-FFF2-40B4-BE49-F238E27FC236}">
+                <a16:creationId xmlns:a16="http://schemas.microsoft.com/office/drawing/2014/main" id="{F0B00435-6DD5-5F57-DBE6-1B477BF0BFF4}"/>
+              </a:ext>
+            </a:extLst>
+          </p:cNvPr>
+          <p:cNvPicPr>
+            <a:picLocks noChangeAspect="1" noChangeArrowheads="1"/>
+          </p:cNvPicPr>
+          <p:nvPr/>
+        </p:nvPicPr>
+        <p:blipFill>
+          <a:blip r:embed="rId2">
+            <a:extLst>
+              <a:ext uri="{28A0092B-C50C-407E-A947-70E740481C1C}">
+                <a14:useLocalDpi xmlns:a14="http://schemas.microsoft.com/office/drawing/2010/main" val="0"/>
+              </a:ext>
+            </a:extLst>
+          </a:blip>
+          <a:srcRect/>
+          <a:stretch>
+            <a:fillRect/>
+          </a:stretch>
+        </p:blipFill>
+        <p:spPr bwMode="auto">
+          <a:xfrm>
+            <a:off x="3422196" y="5429560"/>
+            <a:ext cx="478895" cy="478895"/>
+          </a:xfrm>
+          <a:prstGeom prst="rect">
+            <a:avLst/>
+          </a:prstGeom>
+          <a:noFill/>
+          <a:extLst>
+            <a:ext uri="{909E8E84-426E-40DD-AFC4-6F175D3DCCD1}">
+              <a14:hiddenFill xmlns:a14="http://schemas.microsoft.com/office/drawing/2010/main">
+                <a:solidFill>
+                  <a:srgbClr val="FFFFFF"/>
+                </a:solidFill>
+              </a14:hiddenFill>
+            </a:ext>
+          </a:extLst>
+        </p:spPr>
+      </p:pic>
+      <p:cxnSp>
+        <p:nvCxnSpPr>
+          <p:cNvPr id="60" name="Straight Connector 59">
+            <a:extLst>
+              <a:ext uri="{FF2B5EF4-FFF2-40B4-BE49-F238E27FC236}">
+                <a16:creationId xmlns:a16="http://schemas.microsoft.com/office/drawing/2014/main" id="{63D775F4-19B9-3B39-4742-444E2F441171}"/>
+              </a:ext>
+            </a:extLst>
+          </p:cNvPr>
+          <p:cNvCxnSpPr>
+            <a:cxnSpLocks/>
+          </p:cNvCxnSpPr>
+          <p:nvPr/>
+        </p:nvCxnSpPr>
+        <p:spPr>
+          <a:xfrm>
+            <a:off x="2272781" y="5698080"/>
+            <a:ext cx="1060174" cy="0"/>
+          </a:xfrm>
+          <a:prstGeom prst="line">
+            <a:avLst/>
+          </a:prstGeom>
+        </p:spPr>
+        <p:style>
+          <a:lnRef idx="2">
+            <a:schemeClr val="dk1"/>
+          </a:lnRef>
+          <a:fillRef idx="0">
+            <a:schemeClr val="dk1"/>
+          </a:fillRef>
+          <a:effectRef idx="1">
+            <a:schemeClr val="dk1"/>
+          </a:effectRef>
+          <a:fontRef idx="minor">
+            <a:schemeClr val="tx1"/>
+          </a:fontRef>
+        </p:style>
+      </p:cxnSp>
+      <p:sp>
+        <p:nvSpPr>
+          <p:cNvPr id="61" name="Rectangle 60">
+            <a:extLst>
+              <a:ext uri="{FF2B5EF4-FFF2-40B4-BE49-F238E27FC236}">
+                <a16:creationId xmlns:a16="http://schemas.microsoft.com/office/drawing/2014/main" id="{8A914E08-A55B-DE92-EF68-4561B283A9C7}"/>
+              </a:ext>
+            </a:extLst>
+          </p:cNvPr>
+          <p:cNvSpPr/>
+          <p:nvPr/>
+        </p:nvSpPr>
+        <p:spPr>
+          <a:xfrm>
+            <a:off x="2944914" y="5503054"/>
+            <a:ext cx="1819882" cy="390052"/>
+          </a:xfrm>
+          <a:prstGeom prst="rect">
+            <a:avLst/>
+          </a:prstGeom>
+          <a:noFill/>
+          <a:ln>
+            <a:noFill/>
+          </a:ln>
+        </p:spPr>
+        <p:style>
+          <a:lnRef idx="0">
+            <a:scrgbClr r="0" g="0" b="0"/>
+          </a:lnRef>
+          <a:fillRef idx="0">
+            <a:scrgbClr r="0" g="0" b="0"/>
+          </a:fillRef>
+          <a:effectRef idx="0">
+            <a:scrgbClr r="0" g="0" b="0"/>
+          </a:effectRef>
+          <a:fontRef idx="minor">
+            <a:schemeClr val="dk1"/>
+          </a:fontRef>
+        </p:style>
+        <p:txBody>
+          <a:bodyPr rtlCol="0" anchor="ctr"/>
+          <a:lstStyle/>
+          <a:p>
+            <a:pPr algn="ctr"/>
+            <a:r>
+              <a:rPr lang="en-US" sz="1200" b="1" dirty="0">
+                <a:latin typeface="Calibri" panose="020F0502020204030204" pitchFamily="34" charset="0"/>
+                <a:ea typeface="Calibri" panose="020F0502020204030204" pitchFamily="34" charset="0"/>
+                <a:cs typeface="Calibri" panose="020F0502020204030204" pitchFamily="34" charset="0"/>
+              </a:rPr>
+              <a:t>presentation</a:t>
+            </a:r>
+            <a:endParaRPr lang="pl-PL" sz="1400" b="1" dirty="0">
+              <a:latin typeface="Calibri" panose="020F0502020204030204" pitchFamily="34" charset="0"/>
+              <a:ea typeface="Calibri" panose="020F0502020204030204" pitchFamily="34" charset="0"/>
+              <a:cs typeface="Calibri" panose="020F0502020204030204" pitchFamily="34" charset="0"/>
+            </a:endParaRPr>
+          </a:p>
+        </p:txBody>
+      </p:sp>
+      <p:cxnSp>
+        <p:nvCxnSpPr>
+          <p:cNvPr id="62" name="Straight Connector 61">
+            <a:extLst>
+              <a:ext uri="{FF2B5EF4-FFF2-40B4-BE49-F238E27FC236}">
+                <a16:creationId xmlns:a16="http://schemas.microsoft.com/office/drawing/2014/main" id="{335790AA-40E9-AA0E-B9AB-EE4DB9DDFADD}"/>
+              </a:ext>
+            </a:extLst>
+          </p:cNvPr>
+          <p:cNvCxnSpPr>
+            <a:cxnSpLocks/>
+          </p:cNvCxnSpPr>
+          <p:nvPr/>
+        </p:nvCxnSpPr>
+        <p:spPr>
+          <a:xfrm>
+            <a:off x="2272781" y="6349708"/>
+            <a:ext cx="1060174" cy="0"/>
+          </a:xfrm>
+          <a:prstGeom prst="line">
+            <a:avLst/>
+          </a:prstGeom>
+        </p:spPr>
+        <p:style>
+          <a:lnRef idx="2">
+            <a:schemeClr val="dk1"/>
+          </a:lnRef>
+          <a:fillRef idx="0">
+            <a:schemeClr val="dk1"/>
+          </a:fillRef>
+          <a:effectRef idx="1">
+            <a:schemeClr val="dk1"/>
+          </a:effectRef>
+          <a:fontRef idx="minor">
+            <a:schemeClr val="tx1"/>
+          </a:fontRef>
+        </p:style>
+      </p:cxnSp>
+      <p:sp>
+        <p:nvSpPr>
+          <p:cNvPr id="63" name="Rectangle 62">
+            <a:extLst>
+              <a:ext uri="{FF2B5EF4-FFF2-40B4-BE49-F238E27FC236}">
+                <a16:creationId xmlns:a16="http://schemas.microsoft.com/office/drawing/2014/main" id="{86796615-12CA-9903-E035-9CEF05C07F3C}"/>
+              </a:ext>
+            </a:extLst>
+          </p:cNvPr>
+          <p:cNvSpPr/>
+          <p:nvPr/>
+        </p:nvSpPr>
+        <p:spPr>
+          <a:xfrm>
+            <a:off x="3189105" y="6213046"/>
+            <a:ext cx="1331500" cy="361849"/>
+          </a:xfrm>
+          <a:prstGeom prst="rect">
+            <a:avLst/>
+          </a:prstGeom>
+          <a:noFill/>
+          <a:ln>
+            <a:noFill/>
+          </a:ln>
+        </p:spPr>
+        <p:style>
+          <a:lnRef idx="0">
+            <a:scrgbClr r="0" g="0" b="0"/>
+          </a:lnRef>
+          <a:fillRef idx="0">
+            <a:scrgbClr r="0" g="0" b="0"/>
+          </a:fillRef>
+          <a:effectRef idx="0">
+            <a:scrgbClr r="0" g="0" b="0"/>
+          </a:effectRef>
+          <a:fontRef idx="minor">
+            <a:schemeClr val="dk1"/>
+          </a:fontRef>
+        </p:style>
+        <p:txBody>
+          <a:bodyPr rtlCol="0" anchor="ctr"/>
+          <a:lstStyle/>
+          <a:p>
+            <a:pPr algn="ctr"/>
+            <a:r>
+              <a:rPr lang="en-US" sz="1200" b="1" dirty="0">
+                <a:latin typeface="Calibri" panose="020F0502020204030204" pitchFamily="34" charset="0"/>
+                <a:ea typeface="Calibri" panose="020F0502020204030204" pitchFamily="34" charset="0"/>
+                <a:cs typeface="Calibri" panose="020F0502020204030204" pitchFamily="34" charset="0"/>
+              </a:rPr>
+              <a:t>R Scripts</a:t>
+            </a:r>
+            <a:endParaRPr lang="pl-PL" sz="1400" b="1" dirty="0">
+              <a:latin typeface="Calibri" panose="020F0502020204030204" pitchFamily="34" charset="0"/>
+              <a:ea typeface="Calibri" panose="020F0502020204030204" pitchFamily="34" charset="0"/>
+              <a:cs typeface="Calibri" panose="020F0502020204030204" pitchFamily="34" charset="0"/>
+            </a:endParaRPr>
+          </a:p>
+        </p:txBody>
+      </p:sp>
+      <p:cxnSp>
+        <p:nvCxnSpPr>
+          <p:cNvPr id="1027" name="Straight Arrow Connector 1026">
+            <a:extLst>
+              <a:ext uri="{FF2B5EF4-FFF2-40B4-BE49-F238E27FC236}">
+                <a16:creationId xmlns:a16="http://schemas.microsoft.com/office/drawing/2014/main" id="{43ED3374-C99E-69C8-95B0-9523656D3625}"/>
+              </a:ext>
+            </a:extLst>
+          </p:cNvPr>
+          <p:cNvCxnSpPr>
+            <a:cxnSpLocks/>
+          </p:cNvCxnSpPr>
+          <p:nvPr/>
+        </p:nvCxnSpPr>
+        <p:spPr>
+          <a:xfrm flipV="1">
+            <a:off x="4372550" y="5656270"/>
+            <a:ext cx="737082" cy="12738"/>
+          </a:xfrm>
+          <a:prstGeom prst="straightConnector1">
+            <a:avLst/>
+          </a:prstGeom>
+          <a:ln w="9525">
+            <a:prstDash val="dash"/>
+            <a:tailEnd type="triangle"/>
+          </a:ln>
+        </p:spPr>
+        <p:style>
+          <a:lnRef idx="2">
+            <a:schemeClr val="dk1"/>
+          </a:lnRef>
+          <a:fillRef idx="0">
+            <a:schemeClr val="dk1"/>
+          </a:fillRef>
+          <a:effectRef idx="1">
+            <a:schemeClr val="dk1"/>
+          </a:effectRef>
+          <a:fontRef idx="minor">
+            <a:schemeClr val="tx1"/>
+          </a:fontRef>
+        </p:style>
+      </p:cxnSp>
+      <p:sp>
+        <p:nvSpPr>
+          <p:cNvPr id="1029" name="Rectangle 1028">
+            <a:extLst>
+              <a:ext uri="{FF2B5EF4-FFF2-40B4-BE49-F238E27FC236}">
+                <a16:creationId xmlns:a16="http://schemas.microsoft.com/office/drawing/2014/main" id="{2D967794-783B-ED42-0997-3B90D4881859}"/>
+              </a:ext>
+            </a:extLst>
+          </p:cNvPr>
+          <p:cNvSpPr/>
+          <p:nvPr/>
+        </p:nvSpPr>
+        <p:spPr>
+          <a:xfrm>
+            <a:off x="5137402" y="5530124"/>
+            <a:ext cx="3346211" cy="298868"/>
+          </a:xfrm>
+          <a:prstGeom prst="rect">
+            <a:avLst/>
+          </a:prstGeom>
+          <a:noFill/>
+          <a:ln>
+            <a:noFill/>
+          </a:ln>
+        </p:spPr>
+        <p:style>
+          <a:lnRef idx="0">
+            <a:scrgbClr r="0" g="0" b="0"/>
+          </a:lnRef>
+          <a:fillRef idx="0">
+            <a:scrgbClr r="0" g="0" b="0"/>
+          </a:fillRef>
+          <a:effectRef idx="0">
+            <a:scrgbClr r="0" g="0" b="0"/>
+          </a:effectRef>
+          <a:fontRef idx="minor">
+            <a:schemeClr val="dk1"/>
+          </a:fontRef>
+        </p:style>
+        <p:txBody>
+          <a:bodyPr rtlCol="0" anchor="ctr"/>
+          <a:lstStyle/>
+          <a:p>
+            <a:r>
+              <a:rPr lang="en-US" sz="1400" b="1" dirty="0">
+                <a:latin typeface="Calibri" panose="020F0502020204030204" pitchFamily="34" charset="0"/>
+                <a:ea typeface="Calibri" panose="020F0502020204030204" pitchFamily="34" charset="0"/>
+                <a:cs typeface="Calibri" panose="020F0502020204030204" pitchFamily="34" charset="0"/>
+              </a:rPr>
+              <a:t>Proposal presentation</a:t>
+            </a:r>
+            <a:endParaRPr lang="pl-PL" sz="1400" b="1" dirty="0">
+              <a:latin typeface="Calibri" panose="020F0502020204030204" pitchFamily="34" charset="0"/>
+              <a:ea typeface="Calibri" panose="020F0502020204030204" pitchFamily="34" charset="0"/>
+              <a:cs typeface="Calibri" panose="020F0502020204030204" pitchFamily="34" charset="0"/>
+            </a:endParaRPr>
+          </a:p>
+        </p:txBody>
+      </p:sp>
+      <p:cxnSp>
+        <p:nvCxnSpPr>
+          <p:cNvPr id="1030" name="Straight Arrow Connector 1029">
+            <a:extLst>
+              <a:ext uri="{FF2B5EF4-FFF2-40B4-BE49-F238E27FC236}">
+                <a16:creationId xmlns:a16="http://schemas.microsoft.com/office/drawing/2014/main" id="{6293BF55-6B85-94D4-57A7-C9298FB5B169}"/>
+              </a:ext>
+            </a:extLst>
+          </p:cNvPr>
+          <p:cNvCxnSpPr>
+            <a:cxnSpLocks/>
+          </p:cNvCxnSpPr>
+          <p:nvPr/>
+        </p:nvCxnSpPr>
+        <p:spPr>
+          <a:xfrm flipV="1">
+            <a:off x="4372550" y="6339809"/>
+            <a:ext cx="737082" cy="12738"/>
+          </a:xfrm>
+          <a:prstGeom prst="straightConnector1">
+            <a:avLst/>
+          </a:prstGeom>
+          <a:ln w="9525">
+            <a:prstDash val="dash"/>
+            <a:tailEnd type="triangle"/>
+          </a:ln>
+        </p:spPr>
+        <p:style>
+          <a:lnRef idx="2">
+            <a:schemeClr val="dk1"/>
+          </a:lnRef>
+          <a:fillRef idx="0">
+            <a:schemeClr val="dk1"/>
+          </a:fillRef>
+          <a:effectRef idx="1">
+            <a:schemeClr val="dk1"/>
+          </a:effectRef>
+          <a:fontRef idx="minor">
+            <a:schemeClr val="tx1"/>
+          </a:fontRef>
+        </p:style>
+      </p:cxnSp>
+      <p:sp>
+        <p:nvSpPr>
+          <p:cNvPr id="1031" name="Rectangle 1030">
+            <a:extLst>
+              <a:ext uri="{FF2B5EF4-FFF2-40B4-BE49-F238E27FC236}">
+                <a16:creationId xmlns:a16="http://schemas.microsoft.com/office/drawing/2014/main" id="{ECB4CBA1-0B27-CD80-A703-1DB429B483FC}"/>
+              </a:ext>
+            </a:extLst>
+          </p:cNvPr>
+          <p:cNvSpPr/>
+          <p:nvPr/>
+        </p:nvSpPr>
+        <p:spPr>
+          <a:xfrm>
+            <a:off x="5137402" y="6213663"/>
+            <a:ext cx="3346211" cy="298868"/>
+          </a:xfrm>
+          <a:prstGeom prst="rect">
+            <a:avLst/>
+          </a:prstGeom>
+          <a:noFill/>
+          <a:ln>
+            <a:noFill/>
+          </a:ln>
+        </p:spPr>
+        <p:style>
+          <a:lnRef idx="0">
+            <a:scrgbClr r="0" g="0" b="0"/>
+          </a:lnRef>
+          <a:fillRef idx="0">
+            <a:scrgbClr r="0" g="0" b="0"/>
+          </a:fillRef>
+          <a:effectRef idx="0">
+            <a:scrgbClr r="0" g="0" b="0"/>
+          </a:effectRef>
+          <a:fontRef idx="minor">
+            <a:schemeClr val="dk1"/>
+          </a:fontRef>
+        </p:style>
+        <p:txBody>
+          <a:bodyPr rtlCol="0" anchor="ctr"/>
+          <a:lstStyle/>
+          <a:p>
+            <a:r>
+              <a:rPr lang="en-US" sz="1400" b="1" dirty="0" err="1">
+                <a:latin typeface="Calibri" panose="020F0502020204030204" pitchFamily="34" charset="0"/>
+                <a:ea typeface="Calibri" panose="020F0502020204030204" pitchFamily="34" charset="0"/>
+                <a:cs typeface="Calibri" panose="020F0502020204030204" pitchFamily="34" charset="0"/>
+              </a:rPr>
+              <a:t>Rmd</a:t>
+            </a:r>
+            <a:r>
+              <a:rPr lang="en-US" sz="1400" b="1" dirty="0">
+                <a:latin typeface="Calibri" panose="020F0502020204030204" pitchFamily="34" charset="0"/>
+                <a:ea typeface="Calibri" panose="020F0502020204030204" pitchFamily="34" charset="0"/>
+                <a:cs typeface="Calibri" panose="020F0502020204030204" pitchFamily="34" charset="0"/>
+              </a:rPr>
+              <a:t> from the previous project</a:t>
+            </a:r>
+            <a:endParaRPr lang="pl-PL" sz="1400" b="1" dirty="0">
+              <a:latin typeface="Calibri" panose="020F0502020204030204" pitchFamily="34" charset="0"/>
+              <a:ea typeface="Calibri" panose="020F0502020204030204" pitchFamily="34" charset="0"/>
+              <a:cs typeface="Calibri" panose="020F0502020204030204" pitchFamily="34" charset="0"/>
+            </a:endParaRPr>
+          </a:p>
+        </p:txBody>
+      </p:sp>
+      <p:cxnSp>
+        <p:nvCxnSpPr>
+          <p:cNvPr id="1033" name="Straight Connector 1032">
+            <a:extLst>
+              <a:ext uri="{FF2B5EF4-FFF2-40B4-BE49-F238E27FC236}">
+                <a16:creationId xmlns:a16="http://schemas.microsoft.com/office/drawing/2014/main" id="{ED74124A-6BC0-F207-1C32-EBE1DB1F394C}"/>
+              </a:ext>
+            </a:extLst>
+          </p:cNvPr>
+          <p:cNvCxnSpPr>
+            <a:cxnSpLocks/>
+          </p:cNvCxnSpPr>
+          <p:nvPr/>
+        </p:nvCxnSpPr>
+        <p:spPr>
+          <a:xfrm>
+            <a:off x="3653691" y="1369317"/>
+            <a:ext cx="1073691" cy="0"/>
+          </a:xfrm>
+          <a:prstGeom prst="line">
+            <a:avLst/>
+          </a:prstGeom>
+        </p:spPr>
+        <p:style>
+          <a:lnRef idx="2">
+            <a:schemeClr val="dk1"/>
+          </a:lnRef>
+          <a:fillRef idx="0">
+            <a:schemeClr val="dk1"/>
+          </a:fillRef>
+          <a:effectRef idx="1">
+            <a:schemeClr val="dk1"/>
+          </a:effectRef>
+          <a:fontRef idx="minor">
+            <a:schemeClr val="tx1"/>
+          </a:fontRef>
+        </p:style>
+      </p:cxnSp>
+      <p:cxnSp>
+        <p:nvCxnSpPr>
+          <p:cNvPr id="1035" name="Straight Connector 1034">
+            <a:extLst>
+              <a:ext uri="{FF2B5EF4-FFF2-40B4-BE49-F238E27FC236}">
+                <a16:creationId xmlns:a16="http://schemas.microsoft.com/office/drawing/2014/main" id="{B271F424-F23A-E150-AD03-E2C4725E4C0B}"/>
+              </a:ext>
+            </a:extLst>
+          </p:cNvPr>
+          <p:cNvCxnSpPr>
+            <a:cxnSpLocks/>
+          </p:cNvCxnSpPr>
+          <p:nvPr/>
+        </p:nvCxnSpPr>
+        <p:spPr>
+          <a:xfrm>
+            <a:off x="2272781" y="5074977"/>
+            <a:ext cx="1060174" cy="0"/>
+          </a:xfrm>
+          <a:prstGeom prst="line">
+            <a:avLst/>
+          </a:prstGeom>
+        </p:spPr>
+        <p:style>
+          <a:lnRef idx="2">
+            <a:schemeClr val="dk1"/>
+          </a:lnRef>
+          <a:fillRef idx="0">
+            <a:schemeClr val="dk1"/>
+          </a:fillRef>
+          <a:effectRef idx="1">
+            <a:schemeClr val="dk1"/>
+          </a:effectRef>
+          <a:fontRef idx="minor">
+            <a:schemeClr val="tx1"/>
+          </a:fontRef>
+        </p:style>
+      </p:cxnSp>
+      <p:pic>
+        <p:nvPicPr>
+          <p:cNvPr id="1036" name="Picture 4" descr="Free Folder SVG, PNG Icon, Symbol. Download Image.">
+            <a:extLst>
+              <a:ext uri="{FF2B5EF4-FFF2-40B4-BE49-F238E27FC236}">
+                <a16:creationId xmlns:a16="http://schemas.microsoft.com/office/drawing/2014/main" id="{29DB1622-D82A-39CF-94FE-8CCA176A72EC}"/>
+              </a:ext>
+            </a:extLst>
+          </p:cNvPr>
+          <p:cNvPicPr>
+            <a:picLocks noChangeAspect="1" noChangeArrowheads="1"/>
+          </p:cNvPicPr>
+          <p:nvPr/>
+        </p:nvPicPr>
+        <p:blipFill>
+          <a:blip r:embed="rId2">
+            <a:extLst>
+              <a:ext uri="{28A0092B-C50C-407E-A947-70E740481C1C}">
+                <a14:useLocalDpi xmlns:a14="http://schemas.microsoft.com/office/drawing/2010/main" val="0"/>
+              </a:ext>
+            </a:extLst>
+          </a:blip>
+          <a:srcRect/>
+          <a:stretch>
+            <a:fillRect/>
+          </a:stretch>
+        </p:blipFill>
+        <p:spPr bwMode="auto">
+          <a:xfrm>
+            <a:off x="3416839" y="4758776"/>
+            <a:ext cx="478895" cy="478895"/>
+          </a:xfrm>
+          <a:prstGeom prst="rect">
+            <a:avLst/>
+          </a:prstGeom>
+          <a:noFill/>
+          <a:extLst>
+            <a:ext uri="{909E8E84-426E-40DD-AFC4-6F175D3DCCD1}">
+              <a14:hiddenFill xmlns:a14="http://schemas.microsoft.com/office/drawing/2010/main">
+                <a:solidFill>
+                  <a:srgbClr val="FFFFFF"/>
+                </a:solidFill>
+              </a14:hiddenFill>
+            </a:ext>
+          </a:extLst>
+        </p:spPr>
+      </p:pic>
+      <p:sp>
+        <p:nvSpPr>
+          <p:cNvPr id="1037" name="Rectangle 1036">
+            <a:extLst>
+              <a:ext uri="{FF2B5EF4-FFF2-40B4-BE49-F238E27FC236}">
+                <a16:creationId xmlns:a16="http://schemas.microsoft.com/office/drawing/2014/main" id="{432B71F8-B1C5-1214-F6EC-28A9F4DF01CC}"/>
+              </a:ext>
+            </a:extLst>
+          </p:cNvPr>
+          <p:cNvSpPr/>
+          <p:nvPr/>
+        </p:nvSpPr>
+        <p:spPr>
+          <a:xfrm>
+            <a:off x="2802868" y="4820463"/>
+            <a:ext cx="1819882" cy="390052"/>
+          </a:xfrm>
+          <a:prstGeom prst="rect">
+            <a:avLst/>
+          </a:prstGeom>
+          <a:noFill/>
+          <a:ln>
+            <a:noFill/>
+          </a:ln>
+        </p:spPr>
+        <p:style>
+          <a:lnRef idx="0">
+            <a:scrgbClr r="0" g="0" b="0"/>
+          </a:lnRef>
+          <a:fillRef idx="0">
+            <a:scrgbClr r="0" g="0" b="0"/>
+          </a:fillRef>
+          <a:effectRef idx="0">
+            <a:scrgbClr r="0" g="0" b="0"/>
+          </a:effectRef>
+          <a:fontRef idx="minor">
+            <a:schemeClr val="dk1"/>
+          </a:fontRef>
+        </p:style>
+        <p:txBody>
+          <a:bodyPr rtlCol="0" anchor="ctr"/>
+          <a:lstStyle/>
+          <a:p>
+            <a:pPr algn="ctr"/>
+            <a:r>
+              <a:rPr lang="en-US" sz="1200" b="1" dirty="0">
+                <a:latin typeface="Calibri" panose="020F0502020204030204" pitchFamily="34" charset="0"/>
+                <a:ea typeface="Calibri" panose="020F0502020204030204" pitchFamily="34" charset="0"/>
+                <a:cs typeface="Calibri" panose="020F0502020204030204" pitchFamily="34" charset="0"/>
+              </a:rPr>
+              <a:t>model</a:t>
+            </a:r>
+            <a:endParaRPr lang="pl-PL" sz="1400" b="1" dirty="0">
+              <a:latin typeface="Calibri" panose="020F0502020204030204" pitchFamily="34" charset="0"/>
+              <a:ea typeface="Calibri" panose="020F0502020204030204" pitchFamily="34" charset="0"/>
+              <a:cs typeface="Calibri" panose="020F0502020204030204" pitchFamily="34" charset="0"/>
+            </a:endParaRPr>
+          </a:p>
+        </p:txBody>
+      </p:sp>
+      <p:cxnSp>
+        <p:nvCxnSpPr>
+          <p:cNvPr id="1038" name="Straight Arrow Connector 1037">
+            <a:extLst>
+              <a:ext uri="{FF2B5EF4-FFF2-40B4-BE49-F238E27FC236}">
+                <a16:creationId xmlns:a16="http://schemas.microsoft.com/office/drawing/2014/main" id="{58EBB3BD-4079-5E4D-6E80-55EB76EA740E}"/>
+              </a:ext>
+            </a:extLst>
+          </p:cNvPr>
+          <p:cNvCxnSpPr>
+            <a:cxnSpLocks/>
+          </p:cNvCxnSpPr>
+          <p:nvPr/>
+        </p:nvCxnSpPr>
+        <p:spPr>
+          <a:xfrm flipV="1">
+            <a:off x="4372550" y="5022400"/>
+            <a:ext cx="737082" cy="12738"/>
+          </a:xfrm>
+          <a:prstGeom prst="straightConnector1">
+            <a:avLst/>
+          </a:prstGeom>
+          <a:ln w="9525">
+            <a:prstDash val="dash"/>
+            <a:tailEnd type="triangle"/>
+          </a:ln>
+        </p:spPr>
+        <p:style>
+          <a:lnRef idx="2">
+            <a:schemeClr val="dk1"/>
+          </a:lnRef>
+          <a:fillRef idx="0">
+            <a:schemeClr val="dk1"/>
+          </a:fillRef>
+          <a:effectRef idx="1">
+            <a:schemeClr val="dk1"/>
+          </a:effectRef>
+          <a:fontRef idx="minor">
+            <a:schemeClr val="tx1"/>
+          </a:fontRef>
+        </p:style>
+      </p:cxnSp>
+      <p:sp>
+        <p:nvSpPr>
+          <p:cNvPr id="1039" name="Rectangle 1038">
+            <a:extLst>
+              <a:ext uri="{FF2B5EF4-FFF2-40B4-BE49-F238E27FC236}">
+                <a16:creationId xmlns:a16="http://schemas.microsoft.com/office/drawing/2014/main" id="{8F1187D6-ED76-A7D0-6331-0AACAF86EF78}"/>
+              </a:ext>
+            </a:extLst>
+          </p:cNvPr>
+          <p:cNvSpPr/>
+          <p:nvPr/>
+        </p:nvSpPr>
+        <p:spPr>
+          <a:xfrm>
+            <a:off x="5152282" y="4897083"/>
+            <a:ext cx="3346211" cy="298868"/>
+          </a:xfrm>
+          <a:prstGeom prst="rect">
+            <a:avLst/>
+          </a:prstGeom>
+          <a:noFill/>
+          <a:ln>
+            <a:noFill/>
+          </a:ln>
+        </p:spPr>
+        <p:style>
+          <a:lnRef idx="0">
+            <a:scrgbClr r="0" g="0" b="0"/>
+          </a:lnRef>
+          <a:fillRef idx="0">
+            <a:scrgbClr r="0" g="0" b="0"/>
+          </a:fillRef>
+          <a:effectRef idx="0">
+            <a:scrgbClr r="0" g="0" b="0"/>
+          </a:effectRef>
+          <a:fontRef idx="minor">
+            <a:schemeClr val="dk1"/>
+          </a:fontRef>
+        </p:style>
+        <p:txBody>
+          <a:bodyPr rtlCol="0" anchor="ctr"/>
+          <a:lstStyle/>
+          <a:p>
+            <a:r>
+              <a:rPr lang="en-US" sz="1400" b="1" dirty="0">
+                <a:latin typeface="Calibri" panose="020F0502020204030204" pitchFamily="34" charset="0"/>
+                <a:ea typeface="Calibri" panose="020F0502020204030204" pitchFamily="34" charset="0"/>
+                <a:cs typeface="Calibri" panose="020F0502020204030204" pitchFamily="34" charset="0"/>
+              </a:rPr>
+              <a:t>Various models run before selection</a:t>
+            </a:r>
+            <a:endParaRPr lang="pl-PL" sz="1400" b="1" dirty="0">
+              <a:latin typeface="Calibri" panose="020F0502020204030204" pitchFamily="34" charset="0"/>
+              <a:ea typeface="Calibri" panose="020F0502020204030204" pitchFamily="34" charset="0"/>
+              <a:cs typeface="Calibri" panose="020F0502020204030204" pitchFamily="34" charset="0"/>
+            </a:endParaRPr>
+          </a:p>
+        </p:txBody>
+      </p:sp>
+      <p:pic>
+        <p:nvPicPr>
+          <p:cNvPr id="1047" name="Picture 6" descr="Jupyter Notebook FIle Icon on Windows by whimian on DeviantArt">
+            <a:extLst>
+              <a:ext uri="{FF2B5EF4-FFF2-40B4-BE49-F238E27FC236}">
+                <a16:creationId xmlns:a16="http://schemas.microsoft.com/office/drawing/2014/main" id="{FFE7232E-CD6A-C442-A529-50140ECD4810}"/>
+              </a:ext>
+            </a:extLst>
+          </p:cNvPr>
+          <p:cNvPicPr>
+            <a:picLocks noChangeAspect="1" noChangeArrowheads="1"/>
+          </p:cNvPicPr>
+          <p:nvPr/>
+        </p:nvPicPr>
+        <p:blipFill>
+          <a:blip r:embed="rId3">
+            <a:extLst>
+              <a:ext uri="{28A0092B-C50C-407E-A947-70E740481C1C}">
+                <a14:useLocalDpi xmlns:a14="http://schemas.microsoft.com/office/drawing/2010/main" val="0"/>
+              </a:ext>
+            </a:extLst>
+          </a:blip>
+          <a:srcRect/>
+          <a:stretch>
+            <a:fillRect/>
+          </a:stretch>
+        </p:blipFill>
+        <p:spPr bwMode="auto">
+          <a:xfrm>
+            <a:off x="4810168" y="942984"/>
+            <a:ext cx="443191" cy="443191"/>
+          </a:xfrm>
+          <a:prstGeom prst="rect">
+            <a:avLst/>
+          </a:prstGeom>
+          <a:noFill/>
+          <a:extLst>
+            <a:ext uri="{909E8E84-426E-40DD-AFC4-6F175D3DCCD1}">
+              <a14:hiddenFill xmlns:a14="http://schemas.microsoft.com/office/drawing/2010/main">
+                <a:solidFill>
+                  <a:srgbClr val="FFFFFF"/>
+                </a:solidFill>
+              </a14:hiddenFill>
+            </a:ext>
+          </a:extLst>
+        </p:spPr>
+      </p:pic>
+      <p:sp>
+        <p:nvSpPr>
+          <p:cNvPr id="1048" name="Rectangle 1047">
+            <a:extLst>
+              <a:ext uri="{FF2B5EF4-FFF2-40B4-BE49-F238E27FC236}">
+                <a16:creationId xmlns:a16="http://schemas.microsoft.com/office/drawing/2014/main" id="{5BEAB5A8-7218-A32E-1B00-D6690C7DF894}"/>
+              </a:ext>
+            </a:extLst>
+          </p:cNvPr>
+          <p:cNvSpPr/>
+          <p:nvPr/>
+        </p:nvSpPr>
+        <p:spPr>
+          <a:xfrm>
+            <a:off x="5301808" y="1031205"/>
+            <a:ext cx="2568562" cy="281860"/>
+          </a:xfrm>
+          <a:prstGeom prst="rect">
+            <a:avLst/>
+          </a:prstGeom>
+          <a:noFill/>
+          <a:ln>
+            <a:noFill/>
+          </a:ln>
+        </p:spPr>
+        <p:style>
+          <a:lnRef idx="0">
+            <a:scrgbClr r="0" g="0" b="0"/>
+          </a:lnRef>
+          <a:fillRef idx="0">
+            <a:scrgbClr r="0" g="0" b="0"/>
+          </a:fillRef>
+          <a:effectRef idx="0">
+            <a:scrgbClr r="0" g="0" b="0"/>
+          </a:effectRef>
+          <a:fontRef idx="minor">
+            <a:schemeClr val="dk1"/>
+          </a:fontRef>
+        </p:style>
+        <p:txBody>
+          <a:bodyPr rtlCol="0" anchor="ctr"/>
+          <a:lstStyle/>
+          <a:p>
+            <a:r>
+              <a:rPr lang="en-US" sz="1400" b="1" dirty="0" err="1">
+                <a:latin typeface="Calibri" panose="020F0502020204030204" pitchFamily="34" charset="0"/>
+                <a:ea typeface="Calibri" panose="020F0502020204030204" pitchFamily="34" charset="0"/>
+                <a:cs typeface="Calibri" panose="020F0502020204030204" pitchFamily="34" charset="0"/>
+              </a:rPr>
+              <a:t>ProjectDocumentation.ipynb</a:t>
+            </a:r>
+            <a:endParaRPr lang="pl-PL" sz="1400" b="1" dirty="0">
+              <a:latin typeface="Calibri" panose="020F0502020204030204" pitchFamily="34" charset="0"/>
+              <a:ea typeface="Calibri" panose="020F0502020204030204" pitchFamily="34" charset="0"/>
+              <a:cs typeface="Calibri" panose="020F0502020204030204" pitchFamily="34" charset="0"/>
+            </a:endParaRPr>
+          </a:p>
+        </p:txBody>
+      </p:sp>
+    </p:spTree>
+    <p:extLst>
+      <p:ext uri="{BB962C8B-B14F-4D97-AF65-F5344CB8AC3E}">
+        <p14:creationId xmlns:p14="http://schemas.microsoft.com/office/powerpoint/2010/main" val="270142340"/>
+      </p:ext>
+    </p:extLst>
+  </p:cSld>
+  <p:clrMapOvr>
+    <a:masterClrMapping/>
+  </p:clrMapOvr>
+</p:sld>
+</file>
+
 <file path=ppt/theme/theme1.xml><?xml version="1.0" encoding="utf-8"?>
 <a:theme xmlns:a="http://schemas.openxmlformats.org/drawingml/2006/main" name="Office Theme">
   <a:themeElements>

</xml_diff>